<commit_message>
Power -> final version
</commit_message>
<xml_diff>
--- a/Activities/Activity 2/RabbitMQ – components, benefits and application.pptx
+++ b/Activities/Activity 2/RabbitMQ – components, benefits and application.pptx
@@ -5,10 +5,10 @@
     <p:sldMasterId id="2147483660" r:id="rId4"/>
   </p:sldMasterIdLst>
   <p:notesMasterIdLst>
-    <p:notesMasterId r:id="rId31"/>
+    <p:notesMasterId r:id="rId33"/>
   </p:notesMasterIdLst>
   <p:handoutMasterIdLst>
-    <p:handoutMasterId r:id="rId32"/>
+    <p:handoutMasterId r:id="rId34"/>
   </p:handoutMasterIdLst>
   <p:sldIdLst>
     <p:sldId id="257" r:id="rId5"/>
@@ -33,10 +33,12 @@
     <p:sldId id="264" r:id="rId24"/>
     <p:sldId id="265" r:id="rId25"/>
     <p:sldId id="275" r:id="rId26"/>
-    <p:sldId id="276" r:id="rId27"/>
-    <p:sldId id="277" r:id="rId28"/>
-    <p:sldId id="272" r:id="rId29"/>
-    <p:sldId id="266" r:id="rId30"/>
+    <p:sldId id="283" r:id="rId27"/>
+    <p:sldId id="284" r:id="rId28"/>
+    <p:sldId id="276" r:id="rId29"/>
+    <p:sldId id="277" r:id="rId30"/>
+    <p:sldId id="272" r:id="rId31"/>
+    <p:sldId id="266" r:id="rId32"/>
   </p:sldIdLst>
   <p:sldSz cx="12188825" cy="6858000"/>
   <p:notesSz cx="6858000" cy="9144000"/>
@@ -1846,6 +1848,95 @@
               </a:rPr>
               <a:t>Allows the message to be requeued in case of failure.</a:t>
             </a:r>
+          </a:p>
+          <a:p>
+            <a:pPr marL="342900" lvl="0" indent="-342900" algn="l">
+              <a:buFont typeface="+mj-lt"/>
+              <a:buAutoNum type="arabicPeriod"/>
+            </a:pPr>
+            <a:r>
+              <a:rPr lang="en-GB" b="0" i="0" u="none" strike="noStrike" baseline="0" dirty="0">
+                <a:latin typeface="CMR12"/>
+              </a:rPr>
+              <a:t>Cluster creation:</a:t>
+            </a:r>
+          </a:p>
+          <a:p>
+            <a:pPr marL="952393" marR="0" lvl="1" indent="-342900" algn="l" defTabSz="1218987" rtl="0" eaLnBrk="1" fontAlgn="auto" latinLnBrk="0" hangingPunct="1">
+              <a:lnSpc>
+                <a:spcPct val="100000"/>
+              </a:lnSpc>
+              <a:spcBef>
+                <a:spcPts val="0"/>
+              </a:spcBef>
+              <a:spcAft>
+                <a:spcPts val="0"/>
+              </a:spcAft>
+              <a:buClrTx/>
+              <a:buSzTx/>
+              <a:buFont typeface="+mj-lt"/>
+              <a:buAutoNum type="arabicPeriod"/>
+              <a:tabLst/>
+              <a:defRPr/>
+            </a:pPr>
+            <a:r>
+              <a:rPr lang="en-GB" dirty="0"/>
+              <a:t>Sometimes, RabbitMQ has to be able to process more than thousands of messages per second without impacting on the app’s performance. For this, RabbitMQ allows the creation of clusters to scale horizontally the solution</a:t>
+            </a:r>
+          </a:p>
+          <a:p>
+            <a:pPr marL="342900" lvl="0" indent="-342900" algn="l">
+              <a:buFont typeface="+mj-lt"/>
+              <a:buAutoNum type="arabicPeriod"/>
+            </a:pPr>
+            <a:r>
+              <a:rPr lang="en-GB" dirty="0"/>
+              <a:t>Security.</a:t>
+            </a:r>
+          </a:p>
+          <a:p>
+            <a:pPr marL="952393" lvl="1" indent="-342900" algn="l">
+              <a:buFont typeface="+mj-lt"/>
+              <a:buAutoNum type="arabicPeriod"/>
+            </a:pPr>
+            <a:r>
+              <a:rPr lang="en-GB" dirty="0"/>
+              <a:t>TLS.</a:t>
+            </a:r>
+          </a:p>
+          <a:p>
+            <a:pPr marL="1561887" lvl="2" indent="-342900" algn="l">
+              <a:buFont typeface="+mj-lt"/>
+              <a:buAutoNum type="arabicPeriod"/>
+            </a:pPr>
+            <a:r>
+              <a:rPr lang="en-GB" sz="1800" b="0" i="0" u="none" strike="noStrike" baseline="0" dirty="0">
+                <a:latin typeface="CMR12"/>
+              </a:rPr>
+              <a:t>TLS is a cryptographic protocol that provides secure connections through a network, commonly the Internet.</a:t>
+            </a:r>
+          </a:p>
+          <a:p>
+            <a:pPr marL="342900" lvl="0" indent="-342900" algn="l">
+              <a:buFont typeface="+mj-lt"/>
+              <a:buAutoNum type="arabicPeriod"/>
+            </a:pPr>
+            <a:r>
+              <a:rPr lang="en-GB" dirty="0"/>
+              <a:t>Available:</a:t>
+            </a:r>
+          </a:p>
+          <a:p>
+            <a:pPr marL="952393" lvl="1" indent="-342900" algn="l">
+              <a:buFont typeface="+mj-lt"/>
+              <a:buAutoNum type="arabicPeriod"/>
+            </a:pPr>
+            <a:r>
+              <a:rPr lang="en-GB" sz="1800" b="0" i="0" u="none" strike="noStrike" baseline="0" dirty="0">
+                <a:latin typeface="CMR12"/>
+              </a:rPr>
+              <a:t>the queues can be replicated in several nodes of the cluster, providing the security that in case of failure of a node the broker can keep receiving messages of the producers and keep delivering them to the proper consumers</a:t>
+            </a:r>
             <a:endParaRPr lang="en-GB" dirty="0"/>
           </a:p>
         </p:txBody>
@@ -1877,6 +1968,120 @@
     <p:extLst>
       <p:ext uri="{BB962C8B-B14F-4D97-AF65-F5344CB8AC3E}">
         <p14:creationId xmlns:p14="http://schemas.microsoft.com/office/powerpoint/2010/main" val="556528160"/>
+      </p:ext>
+    </p:extLst>
+  </p:cSld>
+  <p:clrMapOvr>
+    <a:masterClrMapping/>
+  </p:clrMapOvr>
+</p:notes>
+</file>
+
+<file path=ppt/notesSlides/notesSlide19.xml><?xml version="1.0" encoding="utf-8"?>
+<p:notes xmlns:a="http://schemas.openxmlformats.org/drawingml/2006/main" xmlns:r="http://schemas.openxmlformats.org/officeDocument/2006/relationships" xmlns:p="http://schemas.openxmlformats.org/presentationml/2006/main">
+  <p:cSld>
+    <p:spTree>
+      <p:nvGrpSpPr>
+        <p:cNvPr id="1" name=""/>
+        <p:cNvGrpSpPr/>
+        <p:nvPr/>
+      </p:nvGrpSpPr>
+      <p:grpSpPr>
+        <a:xfrm>
+          <a:off x="0" y="0"/>
+          <a:ext cx="0" cy="0"/>
+          <a:chOff x="0" y="0"/>
+          <a:chExt cx="0" cy="0"/>
+        </a:xfrm>
+      </p:grpSpPr>
+      <p:sp>
+        <p:nvSpPr>
+          <p:cNvPr id="2" name="Slide Image Placeholder 1"/>
+          <p:cNvSpPr>
+            <a:spLocks noGrp="1" noRot="1" noChangeAspect="1"/>
+          </p:cNvSpPr>
+          <p:nvPr>
+            <p:ph type="sldImg"/>
+          </p:nvPr>
+        </p:nvSpPr>
+        <p:spPr/>
+      </p:sp>
+      <p:sp>
+        <p:nvSpPr>
+          <p:cNvPr id="3" name="Notes Placeholder 2"/>
+          <p:cNvSpPr>
+            <a:spLocks noGrp="1"/>
+          </p:cNvSpPr>
+          <p:nvPr>
+            <p:ph type="body" idx="1"/>
+          </p:nvPr>
+        </p:nvSpPr>
+        <p:spPr/>
+        <p:txBody>
+          <a:bodyPr/>
+          <a:lstStyle/>
+          <a:p>
+            <a:pPr marL="285750" indent="-285750">
+              <a:buFont typeface="Arial" panose="020B0604020202020204" pitchFamily="34" charset="0"/>
+              <a:buChar char="•"/>
+            </a:pPr>
+            <a:r>
+              <a:rPr lang="en-GB" dirty="0"/>
+              <a:t>Complexity: RabbitMQ is user-friendly and it’s easy to modify the configurations to suit the expected porpoise.</a:t>
+            </a:r>
+          </a:p>
+          <a:p>
+            <a:pPr marL="285750" indent="-285750">
+              <a:buFont typeface="Arial" panose="020B0604020202020204" pitchFamily="34" charset="0"/>
+              <a:buChar char="•"/>
+            </a:pPr>
+            <a:r>
+              <a:rPr lang="en-GB" dirty="0"/>
+              <a:t>Latency: Has the lowest latency of the market.</a:t>
+            </a:r>
+          </a:p>
+          <a:p>
+            <a:pPr marL="285750" indent="-285750">
+              <a:buFont typeface="Arial" panose="020B0604020202020204" pitchFamily="34" charset="0"/>
+              <a:buChar char="•"/>
+            </a:pPr>
+            <a:r>
+              <a:rPr lang="en-GB" dirty="0"/>
+              <a:t>Performance: Has one of the best yields of the market</a:t>
+            </a:r>
+          </a:p>
+          <a:p>
+            <a:endParaRPr lang="en-GB" dirty="0"/>
+          </a:p>
+        </p:txBody>
+      </p:sp>
+      <p:sp>
+        <p:nvSpPr>
+          <p:cNvPr id="4" name="Slide Number Placeholder 3"/>
+          <p:cNvSpPr>
+            <a:spLocks noGrp="1"/>
+          </p:cNvSpPr>
+          <p:nvPr>
+            <p:ph type="sldNum" sz="quarter" idx="5"/>
+          </p:nvPr>
+        </p:nvSpPr>
+        <p:spPr/>
+        <p:txBody>
+          <a:bodyPr/>
+          <a:lstStyle/>
+          <a:p>
+            <a:fld id="{3EBA5BD7-F043-4D1B-AA17-CD412FC534DE}" type="slidenum">
+              <a:rPr lang="en-GB" smtClean="0"/>
+              <a:t>24</a:t>
+            </a:fld>
+            <a:endParaRPr lang="en-GB"/>
+          </a:p>
+        </p:txBody>
+      </p:sp>
+    </p:spTree>
+    <p:extLst>
+      <p:ext uri="{BB962C8B-B14F-4D97-AF65-F5344CB8AC3E}">
+        <p14:creationId xmlns:p14="http://schemas.microsoft.com/office/powerpoint/2010/main" val="396530096"/>
       </p:ext>
     </p:extLst>
   </p:cSld>
@@ -1995,6 +2200,506 @@
     <p:extLst>
       <p:ext uri="{BB962C8B-B14F-4D97-AF65-F5344CB8AC3E}">
         <p14:creationId xmlns:p14="http://schemas.microsoft.com/office/powerpoint/2010/main" val="4124506834"/>
+      </p:ext>
+    </p:extLst>
+  </p:cSld>
+  <p:clrMapOvr>
+    <a:masterClrMapping/>
+  </p:clrMapOvr>
+</p:notes>
+</file>
+
+<file path=ppt/notesSlides/notesSlide20.xml><?xml version="1.0" encoding="utf-8"?>
+<p:notes xmlns:a="http://schemas.openxmlformats.org/drawingml/2006/main" xmlns:r="http://schemas.openxmlformats.org/officeDocument/2006/relationships" xmlns:p="http://schemas.openxmlformats.org/presentationml/2006/main">
+  <p:cSld>
+    <p:spTree>
+      <p:nvGrpSpPr>
+        <p:cNvPr id="1" name=""/>
+        <p:cNvGrpSpPr/>
+        <p:nvPr/>
+      </p:nvGrpSpPr>
+      <p:grpSpPr>
+        <a:xfrm>
+          <a:off x="0" y="0"/>
+          <a:ext cx="0" cy="0"/>
+          <a:chOff x="0" y="0"/>
+          <a:chExt cx="0" cy="0"/>
+        </a:xfrm>
+      </p:grpSpPr>
+      <p:sp>
+        <p:nvSpPr>
+          <p:cNvPr id="2" name="Slide Image Placeholder 1"/>
+          <p:cNvSpPr>
+            <a:spLocks noGrp="1" noRot="1" noChangeAspect="1"/>
+          </p:cNvSpPr>
+          <p:nvPr>
+            <p:ph type="sldImg"/>
+          </p:nvPr>
+        </p:nvSpPr>
+        <p:spPr/>
+      </p:sp>
+      <p:sp>
+        <p:nvSpPr>
+          <p:cNvPr id="3" name="Notes Placeholder 2"/>
+          <p:cNvSpPr>
+            <a:spLocks noGrp="1"/>
+          </p:cNvSpPr>
+          <p:nvPr>
+            <p:ph type="body" idx="1"/>
+          </p:nvPr>
+        </p:nvSpPr>
+        <p:spPr/>
+        <p:txBody>
+          <a:bodyPr/>
+          <a:lstStyle/>
+          <a:p>
+            <a:pPr marL="285750" indent="-285750">
+              <a:buFont typeface="Arial" panose="020B0604020202020204" pitchFamily="34" charset="0"/>
+              <a:buChar char="•"/>
+            </a:pPr>
+            <a:r>
+              <a:rPr lang="en-GB" dirty="0"/>
+              <a:t>Latency: The consumers will balloon in memory as they buffer all the messages in their own RAM.</a:t>
+            </a:r>
+          </a:p>
+          <a:p>
+            <a:pPr marL="895243" lvl="1" indent="-285750">
+              <a:buFont typeface="Arial" panose="020B0604020202020204" pitchFamily="34" charset="0"/>
+              <a:buChar char="•"/>
+            </a:pPr>
+            <a:r>
+              <a:rPr lang="en-GB" dirty="0"/>
+              <a:t>A big buffer results in a lot of extra latency if the network performs normally</a:t>
+            </a:r>
+          </a:p>
+          <a:p>
+            <a:pPr marL="895243" lvl="1" indent="-285750">
+              <a:buFont typeface="Arial" panose="020B0604020202020204" pitchFamily="34" charset="0"/>
+              <a:buChar char="•"/>
+            </a:pPr>
+            <a:r>
+              <a:rPr lang="en-GB" dirty="0"/>
+              <a:t>And huge amounts of extra latency if the client suddenly starts taking longer to process the messages.</a:t>
+            </a:r>
+          </a:p>
+          <a:p>
+            <a:pPr marL="285750" marR="0" lvl="0" indent="-285750" algn="l" defTabSz="1218987" rtl="0" eaLnBrk="1" fontAlgn="auto" latinLnBrk="0" hangingPunct="1">
+              <a:lnSpc>
+                <a:spcPct val="100000"/>
+              </a:lnSpc>
+              <a:spcBef>
+                <a:spcPts val="0"/>
+              </a:spcBef>
+              <a:spcAft>
+                <a:spcPts val="0"/>
+              </a:spcAft>
+              <a:buClrTx/>
+              <a:buSzTx/>
+              <a:buFont typeface="Arial" panose="020B0604020202020204" pitchFamily="34" charset="0"/>
+              <a:buChar char="•"/>
+              <a:tabLst/>
+              <a:defRPr/>
+            </a:pPr>
+            <a:r>
+              <a:rPr lang="en-GB" dirty="0"/>
+              <a:t>Resource sharing: The management plug-in has to be enabled. </a:t>
+            </a:r>
+            <a:r>
+              <a:rPr lang="en-GB" dirty="0">
+                <a:sym typeface="Wingdings" panose="05000000000000000000" pitchFamily="2" charset="2"/>
+              </a:rPr>
+              <a:t> By default the UI app will refuse to access to websites hosted on origins different from its own.</a:t>
+            </a:r>
+          </a:p>
+          <a:p>
+            <a:pPr marL="285750" marR="0" lvl="0" indent="-285750" algn="l" defTabSz="1218987" rtl="0" eaLnBrk="1" fontAlgn="auto" latinLnBrk="0" hangingPunct="1">
+              <a:lnSpc>
+                <a:spcPct val="100000"/>
+              </a:lnSpc>
+              <a:spcBef>
+                <a:spcPts val="0"/>
+              </a:spcBef>
+              <a:spcAft>
+                <a:spcPts val="0"/>
+              </a:spcAft>
+              <a:buClrTx/>
+              <a:buSzTx/>
+              <a:buFont typeface="Arial" panose="020B0604020202020204" pitchFamily="34" charset="0"/>
+              <a:buChar char="•"/>
+              <a:tabLst/>
+              <a:defRPr/>
+            </a:pPr>
+            <a:r>
+              <a:rPr lang="en-GB" dirty="0">
+                <a:sym typeface="Wingdings" panose="05000000000000000000" pitchFamily="2" charset="2"/>
+              </a:rPr>
+              <a:t>The AMQP need a certain processing capacity.  Is not intended for its implementation in devices with limited computation resources and furthermore because of the quantity of control traffic that is introduced to offer reliability, is </a:t>
+            </a:r>
+            <a:r>
+              <a:rPr lang="en-GB" dirty="0" err="1">
+                <a:sym typeface="Wingdings" panose="05000000000000000000" pitchFamily="2" charset="2"/>
+              </a:rPr>
+              <a:t>noit</a:t>
+            </a:r>
+            <a:r>
+              <a:rPr lang="en-GB" dirty="0">
+                <a:sym typeface="Wingdings" panose="05000000000000000000" pitchFamily="2" charset="2"/>
+              </a:rPr>
+              <a:t> meant for its implementation in network with low </a:t>
+            </a:r>
+            <a:r>
+              <a:rPr lang="en-GB" dirty="0" err="1">
+                <a:sym typeface="Wingdings" panose="05000000000000000000" pitchFamily="2" charset="2"/>
+              </a:rPr>
+              <a:t>bandwith</a:t>
+            </a:r>
+            <a:r>
+              <a:rPr lang="en-GB" dirty="0">
+                <a:sym typeface="Wingdings" panose="05000000000000000000" pitchFamily="2" charset="2"/>
+              </a:rPr>
+              <a:t>.</a:t>
+            </a:r>
+          </a:p>
+          <a:p>
+            <a:pPr marL="285750" marR="0" lvl="0" indent="-285750" algn="l" defTabSz="1218987" rtl="0" eaLnBrk="1" fontAlgn="auto" latinLnBrk="0" hangingPunct="1">
+              <a:lnSpc>
+                <a:spcPct val="100000"/>
+              </a:lnSpc>
+              <a:spcBef>
+                <a:spcPts val="0"/>
+              </a:spcBef>
+              <a:spcAft>
+                <a:spcPts val="0"/>
+              </a:spcAft>
+              <a:buClrTx/>
+              <a:buSzTx/>
+              <a:buFont typeface="Arial" panose="020B0604020202020204" pitchFamily="34" charset="0"/>
+              <a:buChar char="•"/>
+              <a:tabLst/>
+              <a:defRPr/>
+            </a:pPr>
+            <a:endParaRPr lang="en-GB" dirty="0"/>
+          </a:p>
+          <a:p>
+            <a:pPr marL="285750" marR="0" lvl="0" indent="-285750" algn="l" defTabSz="1218987" rtl="0" eaLnBrk="1" fontAlgn="auto" latinLnBrk="0" hangingPunct="1">
+              <a:lnSpc>
+                <a:spcPct val="100000"/>
+              </a:lnSpc>
+              <a:spcBef>
+                <a:spcPts val="0"/>
+              </a:spcBef>
+              <a:spcAft>
+                <a:spcPts val="0"/>
+              </a:spcAft>
+              <a:buClrTx/>
+              <a:buSzTx/>
+              <a:buFont typeface="Arial" panose="020B0604020202020204" pitchFamily="34" charset="0"/>
+              <a:buChar char="•"/>
+              <a:tabLst/>
+              <a:defRPr/>
+            </a:pPr>
+            <a:endParaRPr lang="en-GB" dirty="0"/>
+          </a:p>
+          <a:p>
+            <a:pPr marL="285750" lvl="0" indent="-285750">
+              <a:buFont typeface="Arial" panose="020B0604020202020204" pitchFamily="34" charset="0"/>
+              <a:buChar char="•"/>
+            </a:pPr>
+            <a:endParaRPr lang="en-GB" dirty="0"/>
+          </a:p>
+        </p:txBody>
+      </p:sp>
+      <p:sp>
+        <p:nvSpPr>
+          <p:cNvPr id="4" name="Slide Number Placeholder 3"/>
+          <p:cNvSpPr>
+            <a:spLocks noGrp="1"/>
+          </p:cNvSpPr>
+          <p:nvPr>
+            <p:ph type="sldNum" sz="quarter" idx="5"/>
+          </p:nvPr>
+        </p:nvSpPr>
+        <p:spPr/>
+        <p:txBody>
+          <a:bodyPr/>
+          <a:lstStyle/>
+          <a:p>
+            <a:fld id="{3EBA5BD7-F043-4D1B-AA17-CD412FC534DE}" type="slidenum">
+              <a:rPr lang="en-GB" smtClean="0"/>
+              <a:t>25</a:t>
+            </a:fld>
+            <a:endParaRPr lang="en-GB"/>
+          </a:p>
+        </p:txBody>
+      </p:sp>
+    </p:spTree>
+    <p:extLst>
+      <p:ext uri="{BB962C8B-B14F-4D97-AF65-F5344CB8AC3E}">
+        <p14:creationId xmlns:p14="http://schemas.microsoft.com/office/powerpoint/2010/main" val="2992329869"/>
+      </p:ext>
+    </p:extLst>
+  </p:cSld>
+  <p:clrMapOvr>
+    <a:masterClrMapping/>
+  </p:clrMapOvr>
+</p:notes>
+</file>
+
+<file path=ppt/notesSlides/notesSlide21.xml><?xml version="1.0" encoding="utf-8"?>
+<p:notes xmlns:a="http://schemas.openxmlformats.org/drawingml/2006/main" xmlns:r="http://schemas.openxmlformats.org/officeDocument/2006/relationships" xmlns:p="http://schemas.openxmlformats.org/presentationml/2006/main">
+  <p:cSld>
+    <p:spTree>
+      <p:nvGrpSpPr>
+        <p:cNvPr id="1" name=""/>
+        <p:cNvGrpSpPr/>
+        <p:nvPr/>
+      </p:nvGrpSpPr>
+      <p:grpSpPr>
+        <a:xfrm>
+          <a:off x="0" y="0"/>
+          <a:ext cx="0" cy="0"/>
+          <a:chOff x="0" y="0"/>
+          <a:chExt cx="0" cy="0"/>
+        </a:xfrm>
+      </p:grpSpPr>
+      <p:sp>
+        <p:nvSpPr>
+          <p:cNvPr id="2" name="Slide Image Placeholder 1"/>
+          <p:cNvSpPr>
+            <a:spLocks noGrp="1" noRot="1" noChangeAspect="1"/>
+          </p:cNvSpPr>
+          <p:nvPr>
+            <p:ph type="sldImg"/>
+          </p:nvPr>
+        </p:nvSpPr>
+        <p:spPr/>
+      </p:sp>
+      <p:sp>
+        <p:nvSpPr>
+          <p:cNvPr id="3" name="Notes Placeholder 2"/>
+          <p:cNvSpPr>
+            <a:spLocks noGrp="1"/>
+          </p:cNvSpPr>
+          <p:nvPr>
+            <p:ph type="body" idx="1"/>
+          </p:nvPr>
+        </p:nvSpPr>
+        <p:spPr/>
+        <p:txBody>
+          <a:bodyPr/>
+          <a:lstStyle/>
+          <a:p>
+            <a:r>
+              <a:rPr lang="en-GB" dirty="0"/>
+              <a:t>Kafka, Memphis, ActiveMQ, WSO2, </a:t>
+            </a:r>
+            <a:r>
+              <a:rPr lang="en-GB" dirty="0" err="1"/>
+              <a:t>ZeroMQ</a:t>
+            </a:r>
+            <a:endParaRPr lang="en-GB" dirty="0"/>
+          </a:p>
+        </p:txBody>
+      </p:sp>
+      <p:sp>
+        <p:nvSpPr>
+          <p:cNvPr id="4" name="Slide Number Placeholder 3"/>
+          <p:cNvSpPr>
+            <a:spLocks noGrp="1"/>
+          </p:cNvSpPr>
+          <p:nvPr>
+            <p:ph type="sldNum" sz="quarter" idx="5"/>
+          </p:nvPr>
+        </p:nvSpPr>
+        <p:spPr/>
+        <p:txBody>
+          <a:bodyPr/>
+          <a:lstStyle/>
+          <a:p>
+            <a:fld id="{3EBA5BD7-F043-4D1B-AA17-CD412FC534DE}" type="slidenum">
+              <a:rPr lang="en-GB" smtClean="0"/>
+              <a:t>26</a:t>
+            </a:fld>
+            <a:endParaRPr lang="en-GB"/>
+          </a:p>
+        </p:txBody>
+      </p:sp>
+    </p:spTree>
+    <p:extLst>
+      <p:ext uri="{BB962C8B-B14F-4D97-AF65-F5344CB8AC3E}">
+        <p14:creationId xmlns:p14="http://schemas.microsoft.com/office/powerpoint/2010/main" val="1683196606"/>
+      </p:ext>
+    </p:extLst>
+  </p:cSld>
+  <p:clrMapOvr>
+    <a:masterClrMapping/>
+  </p:clrMapOvr>
+</p:notes>
+</file>
+
+<file path=ppt/notesSlides/notesSlide22.xml><?xml version="1.0" encoding="utf-8"?>
+<p:notes xmlns:a="http://schemas.openxmlformats.org/drawingml/2006/main" xmlns:r="http://schemas.openxmlformats.org/officeDocument/2006/relationships" xmlns:p="http://schemas.openxmlformats.org/presentationml/2006/main">
+  <p:cSld>
+    <p:spTree>
+      <p:nvGrpSpPr>
+        <p:cNvPr id="1" name=""/>
+        <p:cNvGrpSpPr/>
+        <p:nvPr/>
+      </p:nvGrpSpPr>
+      <p:grpSpPr>
+        <a:xfrm>
+          <a:off x="0" y="0"/>
+          <a:ext cx="0" cy="0"/>
+          <a:chOff x="0" y="0"/>
+          <a:chExt cx="0" cy="0"/>
+        </a:xfrm>
+      </p:grpSpPr>
+      <p:sp>
+        <p:nvSpPr>
+          <p:cNvPr id="2" name="Slide Image Placeholder 1"/>
+          <p:cNvSpPr>
+            <a:spLocks noGrp="1" noRot="1" noChangeAspect="1"/>
+          </p:cNvSpPr>
+          <p:nvPr>
+            <p:ph type="sldImg"/>
+          </p:nvPr>
+        </p:nvSpPr>
+        <p:spPr/>
+      </p:sp>
+      <p:sp>
+        <p:nvSpPr>
+          <p:cNvPr id="3" name="Notes Placeholder 2"/>
+          <p:cNvSpPr>
+            <a:spLocks noGrp="1"/>
+          </p:cNvSpPr>
+          <p:nvPr>
+            <p:ph type="body" idx="1"/>
+          </p:nvPr>
+        </p:nvSpPr>
+        <p:spPr/>
+        <p:txBody>
+          <a:bodyPr/>
+          <a:lstStyle/>
+          <a:p>
+            <a:pPr marL="514350" indent="-514350">
+              <a:buFont typeface="+mj-lt"/>
+              <a:buAutoNum type="arabicPeriod"/>
+            </a:pPr>
+            <a:r>
+              <a:rPr lang="en-GB" dirty="0"/>
+              <a:t>RabbitMQ can support a lot of messaging protocols.</a:t>
+            </a:r>
+          </a:p>
+          <a:p>
+            <a:pPr marL="514350" indent="-514350">
+              <a:buFont typeface="+mj-lt"/>
+              <a:buAutoNum type="arabicPeriod"/>
+            </a:pPr>
+            <a:r>
+              <a:rPr lang="en-GB" dirty="0"/>
+              <a:t>RabbitMQ is uncomplicated to use, reliable, scalable, available, secure, affordable, fault-tolerant and efficient.</a:t>
+            </a:r>
+          </a:p>
+          <a:p>
+            <a:pPr marL="514350" indent="-514350">
+              <a:buFont typeface="+mj-lt"/>
+              <a:buAutoNum type="arabicPeriod"/>
+            </a:pPr>
+            <a:r>
+              <a:rPr lang="en-GB" dirty="0"/>
+              <a:t>There are many libraries available to implement it.</a:t>
+            </a:r>
+          </a:p>
+          <a:p>
+            <a:pPr marL="514350" indent="-514350">
+              <a:buFont typeface="+mj-lt"/>
+              <a:buAutoNum type="arabicPeriod"/>
+            </a:pPr>
+            <a:r>
+              <a:rPr lang="en-GB" dirty="0"/>
+              <a:t>The exchange is a key element in a message-broker.</a:t>
+            </a:r>
+          </a:p>
+          <a:p>
+            <a:pPr marL="514350" indent="-514350">
+              <a:buFont typeface="+mj-lt"/>
+              <a:buAutoNum type="arabicPeriod"/>
+            </a:pPr>
+            <a:r>
+              <a:rPr lang="en-GB" dirty="0"/>
+              <a:t>Many similarities between </a:t>
+            </a:r>
+            <a:r>
+              <a:rPr lang="en-GB" dirty="0" err="1"/>
+              <a:t>Apaches’</a:t>
+            </a:r>
+            <a:r>
+              <a:rPr lang="en-GB" dirty="0"/>
+              <a:t> VH and RabbitMQ’s VH.</a:t>
+            </a:r>
+          </a:p>
+          <a:p>
+            <a:pPr marL="514350" indent="-514350">
+              <a:buFont typeface="+mj-lt"/>
+              <a:buAutoNum type="arabicPeriod"/>
+            </a:pPr>
+            <a:r>
+              <a:rPr lang="en-GB" dirty="0"/>
+              <a:t>Every message has an “id” that makes it unique.</a:t>
+            </a:r>
+          </a:p>
+          <a:p>
+            <a:pPr marL="514350" indent="-514350">
+              <a:buFont typeface="+mj-lt"/>
+              <a:buAutoNum type="arabicPeriod"/>
+            </a:pPr>
+            <a:r>
+              <a:rPr lang="en-GB" dirty="0"/>
+              <a:t>Is not perfect, but there are more advantages than disadvantages.</a:t>
+            </a:r>
+          </a:p>
+          <a:p>
+            <a:pPr marL="514350" indent="-514350">
+              <a:buFont typeface="+mj-lt"/>
+              <a:buAutoNum type="arabicPeriod"/>
+            </a:pPr>
+            <a:r>
+              <a:rPr lang="en-GB" dirty="0"/>
+              <a:t>Has a lot of competition in the market, but is the most chosen.</a:t>
+            </a:r>
+          </a:p>
+          <a:p>
+            <a:endParaRPr lang="en-GB" dirty="0"/>
+          </a:p>
+        </p:txBody>
+      </p:sp>
+      <p:sp>
+        <p:nvSpPr>
+          <p:cNvPr id="4" name="Slide Number Placeholder 3"/>
+          <p:cNvSpPr>
+            <a:spLocks noGrp="1"/>
+          </p:cNvSpPr>
+          <p:nvPr>
+            <p:ph type="sldNum" sz="quarter" idx="5"/>
+          </p:nvPr>
+        </p:nvSpPr>
+        <p:spPr/>
+        <p:txBody>
+          <a:bodyPr/>
+          <a:lstStyle/>
+          <a:p>
+            <a:fld id="{3EBA5BD7-F043-4D1B-AA17-CD412FC534DE}" type="slidenum">
+              <a:rPr lang="en-GB" smtClean="0"/>
+              <a:t>27</a:t>
+            </a:fld>
+            <a:endParaRPr lang="en-GB"/>
+          </a:p>
+        </p:txBody>
+      </p:sp>
+    </p:spTree>
+    <p:extLst>
+      <p:ext uri="{BB962C8B-B14F-4D97-AF65-F5344CB8AC3E}">
+        <p14:creationId xmlns:p14="http://schemas.microsoft.com/office/powerpoint/2010/main" val="883143198"/>
       </p:ext>
     </p:extLst>
   </p:cSld>
@@ -9550,65 +10255,51 @@
         </p:nvSpPr>
         <p:spPr/>
         <p:txBody>
-          <a:bodyPr>
-            <a:normAutofit/>
+          <a:bodyPr anchor="ctr">
+            <a:normAutofit fontScale="85000" lnSpcReduction="10000"/>
           </a:bodyPr>
           <a:lstStyle/>
           <a:p>
-            <a:pPr marL="514350" indent="-514350">
-              <a:buFont typeface="+mj-lt"/>
-              <a:buAutoNum type="arabicPeriod"/>
-            </a:pPr>
             <a:r>
               <a:rPr lang="en-GB" dirty="0"/>
               <a:t>Decoupling in time and in space.</a:t>
             </a:r>
           </a:p>
           <a:p>
-            <a:pPr marL="819096" lvl="1" indent="-514350">
-              <a:buFont typeface="+mj-lt"/>
-              <a:buAutoNum type="arabicPeriod"/>
-            </a:pPr>
+            <a:pPr marL="819096" lvl="1" indent="-514350"/>
             <a:r>
               <a:rPr lang="en-GB" dirty="0"/>
               <a:t>Integration of apps through messages and from various locations.</a:t>
             </a:r>
           </a:p>
           <a:p>
-            <a:pPr marL="514350" indent="-514350">
-              <a:buFont typeface="+mj-lt"/>
-              <a:buAutoNum type="arabicPeriod"/>
-            </a:pPr>
             <a:r>
               <a:rPr lang="en-GB" dirty="0"/>
               <a:t>Reliability.</a:t>
             </a:r>
           </a:p>
           <a:p>
-            <a:pPr marL="819096" lvl="1" indent="-514350">
-              <a:buFont typeface="+mj-lt"/>
-              <a:buAutoNum type="arabicPeriod"/>
-            </a:pPr>
+            <a:pPr marL="819096" lvl="1" indent="-514350"/>
             <a:r>
               <a:rPr lang="en-GB" dirty="0"/>
               <a:t>Several characteristics that guarantee the delivery of the messages.</a:t>
             </a:r>
           </a:p>
           <a:p>
-            <a:pPr marL="514350" indent="-514350">
-              <a:buFont typeface="+mj-lt"/>
-              <a:buAutoNum type="arabicPeriod"/>
-            </a:pPr>
-            <a:r>
-              <a:rPr lang="en-GB"/>
+            <a:r>
+              <a:rPr lang="en-GB" dirty="0"/>
               <a:t>Cluster creation.</a:t>
             </a:r>
           </a:p>
           <a:p>
-            <a:pPr marL="819096" lvl="1" indent="-514350">
-              <a:buFont typeface="+mj-lt"/>
-              <a:buAutoNum type="arabicPeriod"/>
-            </a:pPr>
+            <a:pPr marL="819096" lvl="1" indent="-514350"/>
+            <a:r>
+              <a:rPr lang="en-GB" dirty="0"/>
+              <a:t>Sometimes, RabbitMQ has to be able to process more than thousands of messages per second without impacting on the app’s performance. For this, RabbitMQ allows the creation of clusters to scale horizontally the solution</a:t>
+            </a:r>
+          </a:p>
+          <a:p>
+            <a:pPr marL="819096" lvl="1" indent="-514350"/>
             <a:endParaRPr lang="en-GB" dirty="0"/>
           </a:p>
         </p:txBody>
@@ -9631,12 +10322,54 @@
         </p:nvSpPr>
         <p:spPr/>
         <p:txBody>
-          <a:bodyPr>
-            <a:normAutofit/>
+          <a:bodyPr anchor="ctr">
+            <a:normAutofit fontScale="85000" lnSpcReduction="10000"/>
           </a:bodyPr>
           <a:lstStyle/>
           <a:p>
-            <a:endParaRPr lang="en-GB"/>
+            <a:r>
+              <a:rPr lang="en-GB" dirty="0"/>
+              <a:t>Security.</a:t>
+            </a:r>
+          </a:p>
+          <a:p>
+            <a:pPr lvl="1"/>
+            <a:r>
+              <a:rPr lang="en-GB" dirty="0"/>
+              <a:t>RabbitMQ uses the Transport Layer Security (TLS) protocol.</a:t>
+            </a:r>
+          </a:p>
+          <a:p>
+            <a:pPr lvl="2"/>
+            <a:r>
+              <a:rPr lang="en-GB" dirty="0"/>
+              <a:t>Is a cryptographic protocol that provides secure connections through a network</a:t>
+            </a:r>
+          </a:p>
+          <a:p>
+            <a:r>
+              <a:rPr lang="en-GB" dirty="0"/>
+              <a:t>Available.</a:t>
+            </a:r>
+          </a:p>
+          <a:p>
+            <a:pPr lvl="1"/>
+            <a:r>
+              <a:rPr lang="en-GB" dirty="0"/>
+              <a:t>The queues can be replicated in several nodes of the cluster and in case of failure of a node the broker can keep receiving and sending messages.</a:t>
+            </a:r>
+          </a:p>
+          <a:p>
+            <a:r>
+              <a:rPr lang="en-GB" dirty="0"/>
+              <a:t>Affordable: Completely free.</a:t>
+            </a:r>
+          </a:p>
+          <a:p>
+            <a:r>
+              <a:rPr lang="en-GB" dirty="0"/>
+              <a:t>Fault-tolerance (next slide)</a:t>
+            </a:r>
           </a:p>
         </p:txBody>
       </p:sp>
@@ -9687,7 +10420,7 @@
           <p:cNvPr id="2" name="Title 1">
             <a:extLst>
               <a:ext uri="{FF2B5EF4-FFF2-40B4-BE49-F238E27FC236}">
-                <a16:creationId xmlns:a16="http://schemas.microsoft.com/office/drawing/2014/main" id="{EA851C17-C279-92A7-14ED-C46946E3B7A9}"/>
+                <a16:creationId xmlns:a16="http://schemas.microsoft.com/office/drawing/2014/main" id="{93D980F4-1B0C-9CE4-978A-34BCFFCC96D3}"/>
               </a:ext>
             </a:extLst>
           </p:cNvPr>
@@ -9705,40 +10438,50 @@
           <a:p>
             <a:r>
               <a:rPr lang="en-GB" dirty="0"/>
-              <a:t>RabbitMQ in the market - Disadvantages</a:t>
-            </a:r>
-          </a:p>
-        </p:txBody>
-      </p:sp>
-      <p:sp>
-        <p:nvSpPr>
-          <p:cNvPr id="3" name="Content Placeholder 2">
+              <a:t>RabbitMQ in the market - Advantages</a:t>
+            </a:r>
+          </a:p>
+        </p:txBody>
+      </p:sp>
+      <p:pic>
+        <p:nvPicPr>
+          <p:cNvPr id="7" name="Content Placeholder 6">
             <a:extLst>
               <a:ext uri="{FF2B5EF4-FFF2-40B4-BE49-F238E27FC236}">
-                <a16:creationId xmlns:a16="http://schemas.microsoft.com/office/drawing/2014/main" id="{2E9DC9FD-98D3-EFBF-F11E-FACBBCF27E95}"/>
+                <a16:creationId xmlns:a16="http://schemas.microsoft.com/office/drawing/2014/main" id="{38FAFD53-849E-83E2-77D0-B2CE694A8C6C}"/>
               </a:ext>
             </a:extLst>
           </p:cNvPr>
-          <p:cNvSpPr>
-            <a:spLocks noGrp="1"/>
-          </p:cNvSpPr>
+          <p:cNvPicPr>
+            <a:picLocks noGrp="1" noChangeAspect="1"/>
+          </p:cNvPicPr>
           <p:nvPr>
             <p:ph idx="1"/>
           </p:nvPr>
-        </p:nvSpPr>
-        <p:spPr/>
-        <p:txBody>
-          <a:bodyPr/>
-          <a:lstStyle/>
-          <a:p>
-            <a:endParaRPr lang="en-GB"/>
-          </a:p>
-        </p:txBody>
-      </p:sp>
+        </p:nvPicPr>
+        <p:blipFill>
+          <a:blip r:embed="rId2">
+            <a:extLst>
+              <a:ext uri="{28A0092B-C50C-407E-A947-70E740481C1C}">
+                <a14:useLocalDpi xmlns:a14="http://schemas.microsoft.com/office/drawing/2010/main" val="0"/>
+              </a:ext>
+            </a:extLst>
+          </a:blip>
+          <a:stretch>
+            <a:fillRect/>
+          </a:stretch>
+        </p:blipFill>
+        <p:spPr>
+          <a:xfrm>
+            <a:off x="3458899" y="1498600"/>
+            <a:ext cx="5880468" cy="4871899"/>
+          </a:xfrm>
+        </p:spPr>
+      </p:pic>
     </p:spTree>
     <p:extLst>
       <p:ext uri="{BB962C8B-B14F-4D97-AF65-F5344CB8AC3E}">
-        <p14:creationId xmlns:p14="http://schemas.microsoft.com/office/powerpoint/2010/main" val="4113373776"/>
+        <p14:creationId xmlns:p14="http://schemas.microsoft.com/office/powerpoint/2010/main" val="2706481017"/>
       </p:ext>
     </p:extLst>
   </p:cSld>
@@ -9782,7 +10525,7 @@
           <p:cNvPr id="2" name="Title 1">
             <a:extLst>
               <a:ext uri="{FF2B5EF4-FFF2-40B4-BE49-F238E27FC236}">
-                <a16:creationId xmlns:a16="http://schemas.microsoft.com/office/drawing/2014/main" id="{3FFABD69-E41B-5797-346A-D1E8BA25F0A4}"/>
+                <a16:creationId xmlns:a16="http://schemas.microsoft.com/office/drawing/2014/main" id="{81061AEF-9857-DA5C-4D15-01DAA8C6D336}"/>
               </a:ext>
             </a:extLst>
           </p:cNvPr>
@@ -9800,7 +10543,7 @@
           <a:p>
             <a:r>
               <a:rPr lang="en-GB" dirty="0"/>
-              <a:t>RabbitMQ in the market – Competition in the market</a:t>
+              <a:t>RabbitMQ in the market - Advantages</a:t>
             </a:r>
           </a:p>
         </p:txBody>
@@ -9810,7 +10553,7 @@
           <p:cNvPr id="3" name="Content Placeholder 2">
             <a:extLst>
               <a:ext uri="{FF2B5EF4-FFF2-40B4-BE49-F238E27FC236}">
-                <a16:creationId xmlns:a16="http://schemas.microsoft.com/office/drawing/2014/main" id="{EBB3C9EE-5936-C545-07D6-7BC4C8F5695E}"/>
+                <a16:creationId xmlns:a16="http://schemas.microsoft.com/office/drawing/2014/main" id="{076571E5-91D8-D4AA-7EC9-006AA9BE87D2}"/>
               </a:ext>
             </a:extLst>
           </p:cNvPr>
@@ -9823,17 +10566,32 @@
         </p:nvSpPr>
         <p:spPr/>
         <p:txBody>
-          <a:bodyPr/>
+          <a:bodyPr anchor="ctr"/>
           <a:lstStyle/>
           <a:p>
-            <a:endParaRPr lang="en-GB"/>
+            <a:r>
+              <a:rPr lang="en-GB" dirty="0"/>
+              <a:t>Complexity: RabbitMQ is user-friendly and it’s easy to modify the configurations to suit the expected porpoise.</a:t>
+            </a:r>
+          </a:p>
+          <a:p>
+            <a:r>
+              <a:rPr lang="en-GB" dirty="0"/>
+              <a:t>Latency: Has the lowest latency of the market.</a:t>
+            </a:r>
+          </a:p>
+          <a:p>
+            <a:r>
+              <a:rPr lang="en-GB" dirty="0"/>
+              <a:t>Performance: Has one of the best yields of the market</a:t>
+            </a:r>
           </a:p>
         </p:txBody>
       </p:sp>
     </p:spTree>
     <p:extLst>
       <p:ext uri="{BB962C8B-B14F-4D97-AF65-F5344CB8AC3E}">
-        <p14:creationId xmlns:p14="http://schemas.microsoft.com/office/powerpoint/2010/main" val="3045748797"/>
+        <p14:creationId xmlns:p14="http://schemas.microsoft.com/office/powerpoint/2010/main" val="1820998447"/>
       </p:ext>
     </p:extLst>
   </p:cSld>
@@ -9877,7 +10635,7 @@
           <p:cNvPr id="2" name="Title 1">
             <a:extLst>
               <a:ext uri="{FF2B5EF4-FFF2-40B4-BE49-F238E27FC236}">
-                <a16:creationId xmlns:a16="http://schemas.microsoft.com/office/drawing/2014/main" id="{04D47729-8FD8-0D9D-A19A-E17FF1E96435}"/>
+                <a16:creationId xmlns:a16="http://schemas.microsoft.com/office/drawing/2014/main" id="{EA851C17-C279-92A7-14ED-C46946E3B7A9}"/>
               </a:ext>
             </a:extLst>
           </p:cNvPr>
@@ -9895,7 +10653,7 @@
           <a:p>
             <a:r>
               <a:rPr lang="en-GB" dirty="0"/>
-              <a:t>Conclusions</a:t>
+              <a:t>RabbitMQ in the market - Disadvantages</a:t>
             </a:r>
           </a:p>
         </p:txBody>
@@ -9905,7 +10663,7 @@
           <p:cNvPr id="3" name="Content Placeholder 2">
             <a:extLst>
               <a:ext uri="{FF2B5EF4-FFF2-40B4-BE49-F238E27FC236}">
-                <a16:creationId xmlns:a16="http://schemas.microsoft.com/office/drawing/2014/main" id="{603A7507-7BE8-AB3E-966B-3D48966F1B4A}"/>
+                <a16:creationId xmlns:a16="http://schemas.microsoft.com/office/drawing/2014/main" id="{2E9DC9FD-98D3-EFBF-F11E-FACBBCF27E95}"/>
               </a:ext>
             </a:extLst>
           </p:cNvPr>
@@ -9918,9 +10676,57 @@
         </p:nvSpPr>
         <p:spPr/>
         <p:txBody>
-          <a:bodyPr/>
+          <a:bodyPr anchor="ctr">
+            <a:normAutofit lnSpcReduction="10000"/>
+          </a:bodyPr>
           <a:lstStyle/>
           <a:p>
+            <a:r>
+              <a:rPr lang="en-GB" dirty="0"/>
+              <a:t>Latency: The consumers will balloon in memory as they buffer all the messages in their own RAM.</a:t>
+            </a:r>
+          </a:p>
+          <a:p>
+            <a:pPr lvl="1"/>
+            <a:r>
+              <a:rPr lang="en-GB" dirty="0"/>
+              <a:t>A big buffer results in a lot of extra latency if the network performs normally</a:t>
+            </a:r>
+          </a:p>
+          <a:p>
+            <a:pPr lvl="1"/>
+            <a:r>
+              <a:rPr lang="en-GB" dirty="0"/>
+              <a:t>And huge amounts of extra latency if the client suddenly starts taking longer to process the messages.</a:t>
+            </a:r>
+          </a:p>
+          <a:p>
+            <a:r>
+              <a:rPr lang="en-GB" dirty="0"/>
+              <a:t>Resource sharing: The management plug-in has to be enabled. </a:t>
+            </a:r>
+            <a:r>
+              <a:rPr lang="en-GB" dirty="0">
+                <a:sym typeface="Wingdings" panose="05000000000000000000" pitchFamily="2" charset="2"/>
+              </a:rPr>
+              <a:t> By default the UI app will refuse to access to websites hosted on origins different from its own.</a:t>
+            </a:r>
+          </a:p>
+          <a:p>
+            <a:r>
+              <a:rPr lang="en-GB" dirty="0">
+                <a:sym typeface="Wingdings" panose="05000000000000000000" pitchFamily="2" charset="2"/>
+              </a:rPr>
+              <a:t>The AMQP need a certain processing capacity.</a:t>
+            </a:r>
+          </a:p>
+          <a:p>
+            <a:r>
+              <a:rPr lang="en-GB" dirty="0">
+                <a:sym typeface="Wingdings" panose="05000000000000000000" pitchFamily="2" charset="2"/>
+              </a:rPr>
+              <a:t>RabbitMQ is implemented in Erlang.</a:t>
+            </a:r>
             <a:endParaRPr lang="en-GB" dirty="0"/>
           </a:p>
         </p:txBody>
@@ -9928,7 +10734,7 @@
     </p:spTree>
     <p:extLst>
       <p:ext uri="{BB962C8B-B14F-4D97-AF65-F5344CB8AC3E}">
-        <p14:creationId xmlns:p14="http://schemas.microsoft.com/office/powerpoint/2010/main" val="4076057846"/>
+        <p14:creationId xmlns:p14="http://schemas.microsoft.com/office/powerpoint/2010/main" val="4113373776"/>
       </p:ext>
     </p:extLst>
   </p:cSld>
@@ -9972,6 +10778,438 @@
           <p:cNvPr id="2" name="Title 1">
             <a:extLst>
               <a:ext uri="{FF2B5EF4-FFF2-40B4-BE49-F238E27FC236}">
+                <a16:creationId xmlns:a16="http://schemas.microsoft.com/office/drawing/2014/main" id="{3FFABD69-E41B-5797-346A-D1E8BA25F0A4}"/>
+              </a:ext>
+            </a:extLst>
+          </p:cNvPr>
+          <p:cNvSpPr>
+            <a:spLocks noGrp="1"/>
+          </p:cNvSpPr>
+          <p:nvPr>
+            <p:ph type="title"/>
+          </p:nvPr>
+        </p:nvSpPr>
+        <p:spPr/>
+        <p:txBody>
+          <a:bodyPr/>
+          <a:lstStyle/>
+          <a:p>
+            <a:r>
+              <a:rPr lang="en-GB" dirty="0"/>
+              <a:t>RabbitMQ in the market – Competition in the market</a:t>
+            </a:r>
+          </a:p>
+        </p:txBody>
+      </p:sp>
+      <p:pic>
+        <p:nvPicPr>
+          <p:cNvPr id="9" name="Picture 8">
+            <a:extLst>
+              <a:ext uri="{FF2B5EF4-FFF2-40B4-BE49-F238E27FC236}">
+                <a16:creationId xmlns:a16="http://schemas.microsoft.com/office/drawing/2014/main" id="{61D2ED96-3C94-C046-10B7-BE4B371661CC}"/>
+              </a:ext>
+            </a:extLst>
+          </p:cNvPr>
+          <p:cNvPicPr>
+            <a:picLocks noChangeAspect="1"/>
+          </p:cNvPicPr>
+          <p:nvPr/>
+        </p:nvPicPr>
+        <p:blipFill>
+          <a:blip r:embed="rId3">
+            <a:extLst>
+              <a:ext uri="{28A0092B-C50C-407E-A947-70E740481C1C}">
+                <a14:useLocalDpi xmlns:a14="http://schemas.microsoft.com/office/drawing/2010/main" val="0"/>
+              </a:ext>
+            </a:extLst>
+          </a:blip>
+          <a:stretch>
+            <a:fillRect/>
+          </a:stretch>
+        </p:blipFill>
+        <p:spPr>
+          <a:xfrm>
+            <a:off x="4389358" y="3603275"/>
+            <a:ext cx="4019550" cy="1352550"/>
+          </a:xfrm>
+          <a:prstGeom prst="rect">
+            <a:avLst/>
+          </a:prstGeom>
+        </p:spPr>
+      </p:pic>
+      <p:pic>
+        <p:nvPicPr>
+          <p:cNvPr id="11" name="Picture 10">
+            <a:extLst>
+              <a:ext uri="{FF2B5EF4-FFF2-40B4-BE49-F238E27FC236}">
+                <a16:creationId xmlns:a16="http://schemas.microsoft.com/office/drawing/2014/main" id="{C0E8029E-5D6A-83AC-477D-754D8FC50DF3}"/>
+              </a:ext>
+            </a:extLst>
+          </p:cNvPr>
+          <p:cNvPicPr>
+            <a:picLocks noChangeAspect="1"/>
+          </p:cNvPicPr>
+          <p:nvPr/>
+        </p:nvPicPr>
+        <p:blipFill>
+          <a:blip r:embed="rId4">
+            <a:extLst>
+              <a:ext uri="{28A0092B-C50C-407E-A947-70E740481C1C}">
+                <a14:useLocalDpi xmlns:a14="http://schemas.microsoft.com/office/drawing/2010/main" val="0"/>
+              </a:ext>
+            </a:extLst>
+          </a:blip>
+          <a:stretch>
+            <a:fillRect/>
+          </a:stretch>
+        </p:blipFill>
+        <p:spPr>
+          <a:xfrm>
+            <a:off x="981844" y="1532207"/>
+            <a:ext cx="3485002" cy="1824786"/>
+          </a:xfrm>
+          <a:prstGeom prst="rect">
+            <a:avLst/>
+          </a:prstGeom>
+        </p:spPr>
+      </p:pic>
+      <p:pic>
+        <p:nvPicPr>
+          <p:cNvPr id="13" name="Picture 12">
+            <a:extLst>
+              <a:ext uri="{FF2B5EF4-FFF2-40B4-BE49-F238E27FC236}">
+                <a16:creationId xmlns:a16="http://schemas.microsoft.com/office/drawing/2014/main" id="{75100F16-0549-6D52-AF47-B54D5BCA0EE5}"/>
+              </a:ext>
+            </a:extLst>
+          </p:cNvPr>
+          <p:cNvPicPr>
+            <a:picLocks noChangeAspect="1"/>
+          </p:cNvPicPr>
+          <p:nvPr/>
+        </p:nvPicPr>
+        <p:blipFill>
+          <a:blip r:embed="rId5">
+            <a:extLst>
+              <a:ext uri="{28A0092B-C50C-407E-A947-70E740481C1C}">
+                <a14:useLocalDpi xmlns:a14="http://schemas.microsoft.com/office/drawing/2010/main" val="0"/>
+              </a:ext>
+            </a:extLst>
+          </a:blip>
+          <a:stretch>
+            <a:fillRect/>
+          </a:stretch>
+        </p:blipFill>
+        <p:spPr>
+          <a:xfrm>
+            <a:off x="9007091" y="1896834"/>
+            <a:ext cx="2199890" cy="2199890"/>
+          </a:xfrm>
+          <a:prstGeom prst="rect">
+            <a:avLst/>
+          </a:prstGeom>
+        </p:spPr>
+      </p:pic>
+      <p:pic>
+        <p:nvPicPr>
+          <p:cNvPr id="15" name="Picture 14">
+            <a:extLst>
+              <a:ext uri="{FF2B5EF4-FFF2-40B4-BE49-F238E27FC236}">
+                <a16:creationId xmlns:a16="http://schemas.microsoft.com/office/drawing/2014/main" id="{2CCBA91E-8E8C-C606-56BA-661F859BC9D6}"/>
+              </a:ext>
+            </a:extLst>
+          </p:cNvPr>
+          <p:cNvPicPr>
+            <a:picLocks noChangeAspect="1"/>
+          </p:cNvPicPr>
+          <p:nvPr/>
+        </p:nvPicPr>
+        <p:blipFill>
+          <a:blip r:embed="rId6">
+            <a:extLst>
+              <a:ext uri="{28A0092B-C50C-407E-A947-70E740481C1C}">
+                <a14:useLocalDpi xmlns:a14="http://schemas.microsoft.com/office/drawing/2010/main" val="0"/>
+              </a:ext>
+            </a:extLst>
+          </a:blip>
+          <a:stretch>
+            <a:fillRect/>
+          </a:stretch>
+        </p:blipFill>
+        <p:spPr>
+          <a:xfrm>
+            <a:off x="999085" y="5202107"/>
+            <a:ext cx="3495675" cy="1304925"/>
+          </a:xfrm>
+          <a:prstGeom prst="rect">
+            <a:avLst/>
+          </a:prstGeom>
+        </p:spPr>
+      </p:pic>
+      <p:pic>
+        <p:nvPicPr>
+          <p:cNvPr id="17" name="Picture 16">
+            <a:extLst>
+              <a:ext uri="{FF2B5EF4-FFF2-40B4-BE49-F238E27FC236}">
+                <a16:creationId xmlns:a16="http://schemas.microsoft.com/office/drawing/2014/main" id="{2506B7C5-C660-3085-B635-75657E8D566E}"/>
+              </a:ext>
+            </a:extLst>
+          </p:cNvPr>
+          <p:cNvPicPr>
+            <a:picLocks noChangeAspect="1"/>
+          </p:cNvPicPr>
+          <p:nvPr/>
+        </p:nvPicPr>
+        <p:blipFill>
+          <a:blip r:embed="rId7">
+            <a:extLst>
+              <a:ext uri="{28A0092B-C50C-407E-A947-70E740481C1C}">
+                <a14:useLocalDpi xmlns:a14="http://schemas.microsoft.com/office/drawing/2010/main" val="0"/>
+              </a:ext>
+            </a:extLst>
+          </a:blip>
+          <a:stretch>
+            <a:fillRect/>
+          </a:stretch>
+        </p:blipFill>
+        <p:spPr>
+          <a:xfrm>
+            <a:off x="7844439" y="5250512"/>
+            <a:ext cx="3829050" cy="1390650"/>
+          </a:xfrm>
+          <a:prstGeom prst="rect">
+            <a:avLst/>
+          </a:prstGeom>
+        </p:spPr>
+      </p:pic>
+    </p:spTree>
+    <p:extLst>
+      <p:ext uri="{BB962C8B-B14F-4D97-AF65-F5344CB8AC3E}">
+        <p14:creationId xmlns:p14="http://schemas.microsoft.com/office/powerpoint/2010/main" val="3045748797"/>
+      </p:ext>
+    </p:extLst>
+  </p:cSld>
+  <p:clrMapOvr>
+    <a:masterClrMapping/>
+  </p:clrMapOvr>
+  <mc:AlternateContent xmlns:mc="http://schemas.openxmlformats.org/markup-compatibility/2006" xmlns:p14="http://schemas.microsoft.com/office/powerpoint/2010/main">
+    <mc:Choice Requires="p14">
+      <p:transition spd="med" p14:dur="700">
+        <p:fade/>
+      </p:transition>
+    </mc:Choice>
+    <mc:Fallback xmlns="">
+      <p:transition spd="med">
+        <p:fade/>
+      </p:transition>
+    </mc:Fallback>
+  </mc:AlternateContent>
+</p:sld>
+</file>
+
+<file path=ppt/slides/slide27.xml><?xml version="1.0" encoding="utf-8"?>
+<p:sld xmlns:a="http://schemas.openxmlformats.org/drawingml/2006/main" xmlns:r="http://schemas.openxmlformats.org/officeDocument/2006/relationships" xmlns:p="http://schemas.openxmlformats.org/presentationml/2006/main">
+  <p:cSld>
+    <p:spTree>
+      <p:nvGrpSpPr>
+        <p:cNvPr id="1" name=""/>
+        <p:cNvGrpSpPr/>
+        <p:nvPr/>
+      </p:nvGrpSpPr>
+      <p:grpSpPr>
+        <a:xfrm>
+          <a:off x="0" y="0"/>
+          <a:ext cx="0" cy="0"/>
+          <a:chOff x="0" y="0"/>
+          <a:chExt cx="0" cy="0"/>
+        </a:xfrm>
+      </p:grpSpPr>
+      <p:sp>
+        <p:nvSpPr>
+          <p:cNvPr id="2" name="Title 1">
+            <a:extLst>
+              <a:ext uri="{FF2B5EF4-FFF2-40B4-BE49-F238E27FC236}">
+                <a16:creationId xmlns:a16="http://schemas.microsoft.com/office/drawing/2014/main" id="{04D47729-8FD8-0D9D-A19A-E17FF1E96435}"/>
+              </a:ext>
+            </a:extLst>
+          </p:cNvPr>
+          <p:cNvSpPr>
+            <a:spLocks noGrp="1"/>
+          </p:cNvSpPr>
+          <p:nvPr>
+            <p:ph type="title"/>
+          </p:nvPr>
+        </p:nvSpPr>
+        <p:spPr/>
+        <p:txBody>
+          <a:bodyPr/>
+          <a:lstStyle/>
+          <a:p>
+            <a:r>
+              <a:rPr lang="en-GB" dirty="0"/>
+              <a:t>Conclusions</a:t>
+            </a:r>
+          </a:p>
+        </p:txBody>
+      </p:sp>
+      <p:sp>
+        <p:nvSpPr>
+          <p:cNvPr id="3" name="Content Placeholder 2">
+            <a:extLst>
+              <a:ext uri="{FF2B5EF4-FFF2-40B4-BE49-F238E27FC236}">
+                <a16:creationId xmlns:a16="http://schemas.microsoft.com/office/drawing/2014/main" id="{603A7507-7BE8-AB3E-966B-3D48966F1B4A}"/>
+              </a:ext>
+            </a:extLst>
+          </p:cNvPr>
+          <p:cNvSpPr>
+            <a:spLocks noGrp="1"/>
+          </p:cNvSpPr>
+          <p:nvPr>
+            <p:ph idx="1"/>
+          </p:nvPr>
+        </p:nvSpPr>
+        <p:spPr/>
+        <p:txBody>
+          <a:bodyPr>
+            <a:normAutofit fontScale="92500" lnSpcReduction="10000"/>
+          </a:bodyPr>
+          <a:lstStyle/>
+          <a:p>
+            <a:pPr marL="514350" indent="-514350">
+              <a:buFont typeface="+mj-lt"/>
+              <a:buAutoNum type="arabicPeriod"/>
+            </a:pPr>
+            <a:r>
+              <a:rPr lang="en-GB" dirty="0"/>
+              <a:t>RabbitMQ can support a lot of messaging protocols.</a:t>
+            </a:r>
+          </a:p>
+          <a:p>
+            <a:pPr marL="514350" indent="-514350">
+              <a:buFont typeface="+mj-lt"/>
+              <a:buAutoNum type="arabicPeriod"/>
+            </a:pPr>
+            <a:r>
+              <a:rPr lang="en-GB" dirty="0"/>
+              <a:t>RabbitMQ is uncomplicated to use, reliable, scalable, available, secure, affordable, fault-tolerant and efficient.</a:t>
+            </a:r>
+          </a:p>
+          <a:p>
+            <a:pPr marL="514350" indent="-514350">
+              <a:buFont typeface="+mj-lt"/>
+              <a:buAutoNum type="arabicPeriod"/>
+            </a:pPr>
+            <a:r>
+              <a:rPr lang="en-GB" dirty="0"/>
+              <a:t>There are many libraries available to implement it.</a:t>
+            </a:r>
+          </a:p>
+          <a:p>
+            <a:pPr marL="514350" indent="-514350">
+              <a:buFont typeface="+mj-lt"/>
+              <a:buAutoNum type="arabicPeriod"/>
+            </a:pPr>
+            <a:r>
+              <a:rPr lang="en-GB" dirty="0"/>
+              <a:t>The exchange is a key element in a message-broker.</a:t>
+            </a:r>
+          </a:p>
+          <a:p>
+            <a:pPr marL="514350" indent="-514350">
+              <a:buFont typeface="+mj-lt"/>
+              <a:buAutoNum type="arabicPeriod"/>
+            </a:pPr>
+            <a:r>
+              <a:rPr lang="en-GB" dirty="0"/>
+              <a:t>Many similarities between </a:t>
+            </a:r>
+            <a:r>
+              <a:rPr lang="en-GB" dirty="0" err="1"/>
+              <a:t>Apaches’</a:t>
+            </a:r>
+            <a:r>
+              <a:rPr lang="en-GB" dirty="0"/>
+              <a:t> VH and RabbitMQ’s VH.</a:t>
+            </a:r>
+          </a:p>
+          <a:p>
+            <a:pPr marL="514350" indent="-514350">
+              <a:buFont typeface="+mj-lt"/>
+              <a:buAutoNum type="arabicPeriod"/>
+            </a:pPr>
+            <a:r>
+              <a:rPr lang="en-GB" dirty="0"/>
+              <a:t>Every message has an “id” that makes it unique.</a:t>
+            </a:r>
+          </a:p>
+          <a:p>
+            <a:pPr marL="514350" indent="-514350">
+              <a:buFont typeface="+mj-lt"/>
+              <a:buAutoNum type="arabicPeriod"/>
+            </a:pPr>
+            <a:r>
+              <a:rPr lang="en-GB" dirty="0"/>
+              <a:t>Is not perfect, but there are more advantages than disadvantages.</a:t>
+            </a:r>
+          </a:p>
+          <a:p>
+            <a:pPr marL="514350" indent="-514350">
+              <a:buFont typeface="+mj-lt"/>
+              <a:buAutoNum type="arabicPeriod"/>
+            </a:pPr>
+            <a:r>
+              <a:rPr lang="en-GB" dirty="0"/>
+              <a:t>Has a lot of competition in the market, but is the most chosen.</a:t>
+            </a:r>
+          </a:p>
+        </p:txBody>
+      </p:sp>
+    </p:spTree>
+    <p:extLst>
+      <p:ext uri="{BB962C8B-B14F-4D97-AF65-F5344CB8AC3E}">
+        <p14:creationId xmlns:p14="http://schemas.microsoft.com/office/powerpoint/2010/main" val="4076057846"/>
+      </p:ext>
+    </p:extLst>
+  </p:cSld>
+  <p:clrMapOvr>
+    <a:masterClrMapping/>
+  </p:clrMapOvr>
+  <mc:AlternateContent xmlns:mc="http://schemas.openxmlformats.org/markup-compatibility/2006" xmlns:p14="http://schemas.microsoft.com/office/powerpoint/2010/main">
+    <mc:Choice Requires="p14">
+      <p:transition spd="med" p14:dur="700">
+        <p:fade/>
+      </p:transition>
+    </mc:Choice>
+    <mc:Fallback xmlns="">
+      <p:transition spd="med">
+        <p:fade/>
+      </p:transition>
+    </mc:Fallback>
+  </mc:AlternateContent>
+</p:sld>
+</file>
+
+<file path=ppt/slides/slide28.xml><?xml version="1.0" encoding="utf-8"?>
+<p:sld xmlns:a="http://schemas.openxmlformats.org/drawingml/2006/main" xmlns:r="http://schemas.openxmlformats.org/officeDocument/2006/relationships" xmlns:p="http://schemas.openxmlformats.org/presentationml/2006/main">
+  <p:cSld>
+    <p:spTree>
+      <p:nvGrpSpPr>
+        <p:cNvPr id="1" name=""/>
+        <p:cNvGrpSpPr/>
+        <p:nvPr/>
+      </p:nvGrpSpPr>
+      <p:grpSpPr>
+        <a:xfrm>
+          <a:off x="0" y="0"/>
+          <a:ext cx="0" cy="0"/>
+          <a:chOff x="0" y="0"/>
+          <a:chExt cx="0" cy="0"/>
+        </a:xfrm>
+      </p:grpSpPr>
+      <p:sp>
+        <p:nvSpPr>
+          <p:cNvPr id="2" name="Title 1">
+            <a:extLst>
+              <a:ext uri="{FF2B5EF4-FFF2-40B4-BE49-F238E27FC236}">
                 <a16:creationId xmlns:a16="http://schemas.microsoft.com/office/drawing/2014/main" id="{E993B2CD-C015-92D7-5BC5-2CC994173D3A}"/>
               </a:ext>
             </a:extLst>
@@ -10008,15 +11246,185 @@
             <a:spLocks noGrp="1"/>
           </p:cNvSpPr>
           <p:nvPr>
-            <p:ph idx="1"/>
-          </p:nvPr>
-        </p:nvSpPr>
-        <p:spPr/>
-        <p:txBody>
-          <a:bodyPr/>
+            <p:ph sz="half" idx="1"/>
+          </p:nvPr>
+        </p:nvSpPr>
+        <p:spPr/>
+        <p:txBody>
+          <a:bodyPr>
+            <a:normAutofit fontScale="62500" lnSpcReduction="20000"/>
+          </a:bodyPr>
           <a:lstStyle/>
           <a:p>
-            <a:endParaRPr lang="en-GB"/>
+            <a:r>
+              <a:rPr lang="en-GB" dirty="0">
+                <a:hlinkClick r:id="rId2"/>
+              </a:rPr>
+              <a:t>https://en.wikipedia.org/wiki/RabbitMQ</a:t>
+            </a:r>
+            <a:endParaRPr lang="en-GB" dirty="0"/>
+          </a:p>
+          <a:p>
+            <a:r>
+              <a:rPr lang="en-GB" dirty="0">
+                <a:hlinkClick r:id="rId3"/>
+              </a:rPr>
+              <a:t>https://www.rabbitmq.com</a:t>
+            </a:r>
+            <a:endParaRPr lang="en-GB" dirty="0"/>
+          </a:p>
+          <a:p>
+            <a:r>
+              <a:rPr lang="en-GB" dirty="0">
+                <a:hlinkClick r:id="rId4"/>
+              </a:rPr>
+              <a:t>https://www.sdos.es/blog/microservicios-mensajes-spring-rabbitmq</a:t>
+            </a:r>
+            <a:endParaRPr lang="en-GB" dirty="0"/>
+          </a:p>
+          <a:p>
+            <a:r>
+              <a:rPr lang="en-GB" dirty="0">
+                <a:hlinkClick r:id="rId5"/>
+              </a:rPr>
+              <a:t>https://www.pragma.com.co/academia/lecciones/conozcamos-sobre-rabbitmq-sus-componentes-y-beneficios</a:t>
+            </a:r>
+            <a:endParaRPr lang="en-GB" dirty="0"/>
+          </a:p>
+          <a:p>
+            <a:r>
+              <a:rPr lang="en-GB" dirty="0">
+                <a:hlinkClick r:id="rId6"/>
+              </a:rPr>
+              <a:t>https://www.researchgate.net/publication/325119432/figure/fig5/AS:626093459505153@1526283721309/AMQP-architecture-34.png</a:t>
+            </a:r>
+            <a:endParaRPr lang="en-GB" dirty="0"/>
+          </a:p>
+          <a:p>
+            <a:r>
+              <a:rPr lang="en-GB" dirty="0">
+                <a:hlinkClick r:id="rId7"/>
+              </a:rPr>
+              <a:t>https://www.rabbitmq.com/protocols.html</a:t>
+            </a:r>
+            <a:endParaRPr lang="en-GB" dirty="0"/>
+          </a:p>
+          <a:p>
+            <a:r>
+              <a:rPr lang="en-GB" dirty="0">
+                <a:hlinkClick r:id="rId8"/>
+              </a:rPr>
+              <a:t>https://www.rabbitmq.com/vhosts.html</a:t>
+            </a:r>
+            <a:endParaRPr lang="en-GB" dirty="0"/>
+          </a:p>
+          <a:p>
+            <a:r>
+              <a:rPr lang="en-GB" dirty="0">
+                <a:hlinkClick r:id="rId9"/>
+              </a:rPr>
+              <a:t>https://www.luisllamas.es/que-es-mqtt-su-importancia-como-protocolo-iot/</a:t>
+            </a:r>
+            <a:endParaRPr lang="en-GB" dirty="0"/>
+          </a:p>
+        </p:txBody>
+      </p:sp>
+      <p:sp>
+        <p:nvSpPr>
+          <p:cNvPr id="4" name="Content Placeholder 3">
+            <a:extLst>
+              <a:ext uri="{FF2B5EF4-FFF2-40B4-BE49-F238E27FC236}">
+                <a16:creationId xmlns:a16="http://schemas.microsoft.com/office/drawing/2014/main" id="{D70B59FD-814A-8510-7176-F67D11519E6F}"/>
+              </a:ext>
+            </a:extLst>
+          </p:cNvPr>
+          <p:cNvSpPr>
+            <a:spLocks noGrp="1"/>
+          </p:cNvSpPr>
+          <p:nvPr>
+            <p:ph sz="half" idx="2"/>
+          </p:nvPr>
+        </p:nvSpPr>
+        <p:spPr/>
+        <p:txBody>
+          <a:bodyPr>
+            <a:normAutofit fontScale="62500" lnSpcReduction="20000"/>
+          </a:bodyPr>
+          <a:lstStyle/>
+          <a:p>
+            <a:r>
+              <a:rPr lang="en-GB" dirty="0">
+                <a:hlinkClick r:id="rId10"/>
+              </a:rPr>
+              <a:t>https://en.wikipedia.org/wiki/WebSocket</a:t>
+            </a:r>
+            <a:endParaRPr lang="en-GB" dirty="0"/>
+          </a:p>
+          <a:p>
+            <a:r>
+              <a:rPr lang="en-GB" dirty="0">
+                <a:hlinkClick r:id="rId11"/>
+              </a:rPr>
+              <a:t>http://stomp.github.io</a:t>
+            </a:r>
+            <a:endParaRPr lang="en-GB" dirty="0"/>
+          </a:p>
+          <a:p>
+            <a:r>
+              <a:rPr lang="en-GB" dirty="0">
+                <a:hlinkClick r:id="rId12"/>
+              </a:rPr>
+              <a:t>https://programmerclick.com/article/80671335987/</a:t>
+            </a:r>
+            <a:endParaRPr lang="en-GB" dirty="0"/>
+          </a:p>
+          <a:p>
+            <a:r>
+              <a:rPr lang="en-GB" dirty="0">
+                <a:hlinkClick r:id="rId13"/>
+              </a:rPr>
+              <a:t>https://blog.devgenius.io/scalable-system-implementation-using-rabbitmq-java-and-mysql-2d5fe0fa182e</a:t>
+            </a:r>
+            <a:endParaRPr lang="en-GB" dirty="0"/>
+          </a:p>
+          <a:p>
+            <a:r>
+              <a:rPr lang="en-GB" dirty="0">
+                <a:hlinkClick r:id="rId14"/>
+              </a:rPr>
+              <a:t>https://blog.rabbitmq.com/posts/2012/05/some-queuing-theory-throughput-latency-and-bandwidth/</a:t>
+            </a:r>
+            <a:endParaRPr lang="en-GB" dirty="0"/>
+          </a:p>
+          <a:p>
+            <a:r>
+              <a:rPr lang="en-GB" dirty="0">
+                <a:hlinkClick r:id="rId15"/>
+              </a:rPr>
+              <a:t>https://medium.com/codait/handling-failure-successfully-in-rabbitmq-22ffa982b60f</a:t>
+            </a:r>
+            <a:endParaRPr lang="en-GB" dirty="0"/>
+          </a:p>
+          <a:p>
+            <a:r>
+              <a:rPr lang="en-GB" dirty="0">
+                <a:hlinkClick r:id="rId16"/>
+              </a:rPr>
+              <a:t>https://www.rabbitmq.com/management.html</a:t>
+            </a:r>
+            <a:endParaRPr lang="en-GB" dirty="0"/>
+          </a:p>
+          <a:p>
+            <a:r>
+              <a:rPr lang="en-GB" dirty="0">
+                <a:hlinkClick r:id="rId17"/>
+              </a:rPr>
+              <a:t>https://geekflare.com/es/top-message-brokers/</a:t>
+            </a:r>
+            <a:endParaRPr lang="en-GB" dirty="0"/>
+          </a:p>
+          <a:p>
+            <a:endParaRPr lang="en-GB" dirty="0"/>
           </a:p>
         </p:txBody>
       </p:sp>
@@ -11865,142 +13273,6 @@
 </file>
 
 <file path=customXml/item1.xml><?xml version="1.0" encoding="utf-8"?>
-<p:properties xmlns:p="http://schemas.microsoft.com/office/2006/metadata/properties" xmlns:xsi="http://www.w3.org/2001/XMLSchema-instance" xmlns:pc="http://schemas.microsoft.com/office/infopath/2007/PartnerControls">
-  <documentManagement>
-    <LocPublishedLinkedAssetsLookup xmlns="4873beb7-5857-4685-be1f-d57550cc96cc" xsi:nil="true"/>
-    <ApprovalStatus xmlns="4873beb7-5857-4685-be1f-d57550cc96cc">InProgress</ApprovalStatus>
-    <MarketSpecific xmlns="4873beb7-5857-4685-be1f-d57550cc96cc">false</MarketSpecific>
-    <LocComments xmlns="4873beb7-5857-4685-be1f-d57550cc96cc" xsi:nil="true"/>
-    <LocLastLocAttemptVersionTypeLookup xmlns="4873beb7-5857-4685-be1f-d57550cc96cc" xsi:nil="true"/>
-    <DirectSourceMarket xmlns="4873beb7-5857-4685-be1f-d57550cc96cc" xsi:nil="true"/>
-    <ThumbnailAssetId xmlns="4873beb7-5857-4685-be1f-d57550cc96cc" xsi:nil="true"/>
-    <PrimaryImageGen xmlns="4873beb7-5857-4685-be1f-d57550cc96cc">false</PrimaryImageGen>
-    <LocNewPublishedVersionLookup xmlns="4873beb7-5857-4685-be1f-d57550cc96cc" xsi:nil="true"/>
-    <LegacyData xmlns="4873beb7-5857-4685-be1f-d57550cc96cc" xsi:nil="true"/>
-    <LocRecommendedHandoff xmlns="4873beb7-5857-4685-be1f-d57550cc96cc" xsi:nil="true"/>
-    <BusinessGroup xmlns="4873beb7-5857-4685-be1f-d57550cc96cc" xsi:nil="true"/>
-    <BlockPublish xmlns="4873beb7-5857-4685-be1f-d57550cc96cc">false</BlockPublish>
-    <TPFriendlyName xmlns="4873beb7-5857-4685-be1f-d57550cc96cc" xsi:nil="true"/>
-    <LocOverallPublishStatusLookup xmlns="4873beb7-5857-4685-be1f-d57550cc96cc" xsi:nil="true"/>
-    <NumericId xmlns="4873beb7-5857-4685-be1f-d57550cc96cc" xsi:nil="true"/>
-    <APEditor xmlns="4873beb7-5857-4685-be1f-d57550cc96cc">
-      <UserInfo>
-        <DisplayName/>
-        <AccountId xsi:nil="true"/>
-        <AccountType/>
-      </UserInfo>
-    </APEditor>
-    <SourceTitle xmlns="4873beb7-5857-4685-be1f-d57550cc96cc" xsi:nil="true"/>
-    <OpenTemplate xmlns="4873beb7-5857-4685-be1f-d57550cc96cc">true</OpenTemplate>
-    <LocOverallLocStatusLookup xmlns="4873beb7-5857-4685-be1f-d57550cc96cc" xsi:nil="true"/>
-    <UALocComments xmlns="4873beb7-5857-4685-be1f-d57550cc96cc" xsi:nil="true"/>
-    <ParentAssetId xmlns="4873beb7-5857-4685-be1f-d57550cc96cc" xsi:nil="true"/>
-    <IntlLangReviewDate xmlns="4873beb7-5857-4685-be1f-d57550cc96cc" xsi:nil="true"/>
-    <FeatureTagsTaxHTField0 xmlns="4873beb7-5857-4685-be1f-d57550cc96cc">
-      <Terms xmlns="http://schemas.microsoft.com/office/infopath/2007/PartnerControls"/>
-    </FeatureTagsTaxHTField0>
-    <PublishStatusLookup xmlns="4873beb7-5857-4685-be1f-d57550cc96cc">
-      <Value>1345093</Value>
-    </PublishStatusLookup>
-    <Providers xmlns="4873beb7-5857-4685-be1f-d57550cc96cc" xsi:nil="true"/>
-    <MachineTranslated xmlns="4873beb7-5857-4685-be1f-d57550cc96cc">false</MachineTranslated>
-    <OriginalSourceMarket xmlns="4873beb7-5857-4685-be1f-d57550cc96cc" xsi:nil="true"/>
-    <APDescription xmlns="4873beb7-5857-4685-be1f-d57550cc96cc">This simple template design works for technology and  businesses, but it's versatile enough to use in other contexts.  It features multiple slide layouts designed for widescreen (16x9 resolution) and includes a sample SmartArt list and chart that are easily editable.</APDescription>
-    <ClipArtFilename xmlns="4873beb7-5857-4685-be1f-d57550cc96cc" xsi:nil="true"/>
-    <ContentItem xmlns="4873beb7-5857-4685-be1f-d57550cc96cc" xsi:nil="true"/>
-    <TPInstallLocation xmlns="4873beb7-5857-4685-be1f-d57550cc96cc" xsi:nil="true"/>
-    <PublishTargets xmlns="4873beb7-5857-4685-be1f-d57550cc96cc">OfficeOnlineVNext</PublishTargets>
-    <TimesCloned xmlns="4873beb7-5857-4685-be1f-d57550cc96cc" xsi:nil="true"/>
-    <AssetStart xmlns="4873beb7-5857-4685-be1f-d57550cc96cc">2011-11-26T00:30:00+00:00</AssetStart>
-    <Provider xmlns="4873beb7-5857-4685-be1f-d57550cc96cc" xsi:nil="true"/>
-    <AcquiredFrom xmlns="4873beb7-5857-4685-be1f-d57550cc96cc">Internal MS</AcquiredFrom>
-    <FriendlyTitle xmlns="4873beb7-5857-4685-be1f-d57550cc96cc" xsi:nil="true"/>
-    <LastHandOff xmlns="4873beb7-5857-4685-be1f-d57550cc96cc" xsi:nil="true"/>
-    <TPClientViewer xmlns="4873beb7-5857-4685-be1f-d57550cc96cc" xsi:nil="true"/>
-    <TemplateStatus xmlns="4873beb7-5857-4685-be1f-d57550cc96cc">Complete</TemplateStatus>
-    <Downloads xmlns="4873beb7-5857-4685-be1f-d57550cc96cc">0</Downloads>
-    <OOCacheId xmlns="4873beb7-5857-4685-be1f-d57550cc96cc" xsi:nil="true"/>
-    <IsDeleted xmlns="4873beb7-5857-4685-be1f-d57550cc96cc">false</IsDeleted>
-    <LocPublishedDependentAssetsLookup xmlns="4873beb7-5857-4685-be1f-d57550cc96cc" xsi:nil="true"/>
-    <TPExecutable xmlns="4873beb7-5857-4685-be1f-d57550cc96cc" xsi:nil="true"/>
-    <EditorialTags xmlns="4873beb7-5857-4685-be1f-d57550cc96cc" xsi:nil="true"/>
-    <SubmitterId xmlns="4873beb7-5857-4685-be1f-d57550cc96cc" xsi:nil="true"/>
-    <ApprovalLog xmlns="4873beb7-5857-4685-be1f-d57550cc96cc" xsi:nil="true"/>
-    <AssetType xmlns="4873beb7-5857-4685-be1f-d57550cc96cc">TP</AssetType>
-    <BugNumber xmlns="4873beb7-5857-4685-be1f-d57550cc96cc" xsi:nil="true"/>
-    <CSXSubmissionDate xmlns="4873beb7-5857-4685-be1f-d57550cc96cc" xsi:nil="true"/>
-    <CSXUpdate xmlns="4873beb7-5857-4685-be1f-d57550cc96cc">false</CSXUpdate>
-    <Milestone xmlns="4873beb7-5857-4685-be1f-d57550cc96cc" xsi:nil="true"/>
-    <RecommendationsModifier xmlns="4873beb7-5857-4685-be1f-d57550cc96cc" xsi:nil="true"/>
-    <OriginAsset xmlns="4873beb7-5857-4685-be1f-d57550cc96cc" xsi:nil="true"/>
-    <TPComponent xmlns="4873beb7-5857-4685-be1f-d57550cc96cc" xsi:nil="true"/>
-    <AssetId xmlns="4873beb7-5857-4685-be1f-d57550cc96cc">TP102787989</AssetId>
-    <IntlLocPriority xmlns="4873beb7-5857-4685-be1f-d57550cc96cc" xsi:nil="true"/>
-    <PolicheckWords xmlns="4873beb7-5857-4685-be1f-d57550cc96cc" xsi:nil="true"/>
-    <TPLaunchHelpLink xmlns="4873beb7-5857-4685-be1f-d57550cc96cc" xsi:nil="true"/>
-    <TPApplication xmlns="4873beb7-5857-4685-be1f-d57550cc96cc" xsi:nil="true"/>
-    <CrawlForDependencies xmlns="4873beb7-5857-4685-be1f-d57550cc96cc">false</CrawlForDependencies>
-    <HandoffToMSDN xmlns="4873beb7-5857-4685-be1f-d57550cc96cc" xsi:nil="true"/>
-    <PlannedPubDate xmlns="4873beb7-5857-4685-be1f-d57550cc96cc" xsi:nil="true"/>
-    <IntlLangReviewer xmlns="4873beb7-5857-4685-be1f-d57550cc96cc" xsi:nil="true"/>
-    <TrustLevel xmlns="4873beb7-5857-4685-be1f-d57550cc96cc">1 Microsoft Managed Content</TrustLevel>
-    <LocLastLocAttemptVersionLookup xmlns="4873beb7-5857-4685-be1f-d57550cc96cc">694266</LocLastLocAttemptVersionLookup>
-    <LocProcessedForHandoffsLookup xmlns="4873beb7-5857-4685-be1f-d57550cc96cc" xsi:nil="true"/>
-    <IsSearchable xmlns="4873beb7-5857-4685-be1f-d57550cc96cc">true</IsSearchable>
-    <TemplateTemplateType xmlns="4873beb7-5857-4685-be1f-d57550cc96cc">PowerPoint Presentation Template</TemplateTemplateType>
-    <CampaignTagsTaxHTField0 xmlns="4873beb7-5857-4685-be1f-d57550cc96cc">
-      <Terms xmlns="http://schemas.microsoft.com/office/infopath/2007/PartnerControls"/>
-    </CampaignTagsTaxHTField0>
-    <TPNamespace xmlns="4873beb7-5857-4685-be1f-d57550cc96cc" xsi:nil="true"/>
-    <LocOverallPreviewStatusLookup xmlns="4873beb7-5857-4685-be1f-d57550cc96cc" xsi:nil="true"/>
-    <TaxCatchAll xmlns="4873beb7-5857-4685-be1f-d57550cc96cc"/>
-    <Markets xmlns="4873beb7-5857-4685-be1f-d57550cc96cc"/>
-    <UAProjectedTotalWords xmlns="4873beb7-5857-4685-be1f-d57550cc96cc" xsi:nil="true"/>
-    <IntlLangReview xmlns="4873beb7-5857-4685-be1f-d57550cc96cc" xsi:nil="true"/>
-    <OutputCachingOn xmlns="4873beb7-5857-4685-be1f-d57550cc96cc">false</OutputCachingOn>
-    <AverageRating xmlns="4873beb7-5857-4685-be1f-d57550cc96cc" xsi:nil="true"/>
-    <APAuthor xmlns="4873beb7-5857-4685-be1f-d57550cc96cc">
-      <UserInfo>
-        <DisplayName>REDMOND\kristaa</DisplayName>
-        <AccountId>136</AccountId>
-        <AccountType/>
-      </UserInfo>
-    </APAuthor>
-    <LocManualTestRequired xmlns="4873beb7-5857-4685-be1f-d57550cc96cc">false</LocManualTestRequired>
-    <TPCommandLine xmlns="4873beb7-5857-4685-be1f-d57550cc96cc" xsi:nil="true"/>
-    <TPAppVersion xmlns="4873beb7-5857-4685-be1f-d57550cc96cc" xsi:nil="true"/>
-    <EditorialStatus xmlns="4873beb7-5857-4685-be1f-d57550cc96cc">Complete</EditorialStatus>
-    <LastModifiedDateTime xmlns="4873beb7-5857-4685-be1f-d57550cc96cc" xsi:nil="true"/>
-    <ScenarioTagsTaxHTField0 xmlns="4873beb7-5857-4685-be1f-d57550cc96cc">
-      <Terms xmlns="http://schemas.microsoft.com/office/infopath/2007/PartnerControls"/>
-    </ScenarioTagsTaxHTField0>
-    <LocProcessedForMarketsLookup xmlns="4873beb7-5857-4685-be1f-d57550cc96cc" xsi:nil="true"/>
-    <TPLaunchHelpLinkType xmlns="4873beb7-5857-4685-be1f-d57550cc96cc">Template</TPLaunchHelpLinkType>
-    <OriginalRelease xmlns="4873beb7-5857-4685-be1f-d57550cc96cc">15</OriginalRelease>
-    <LocalizationTagsTaxHTField0 xmlns="4873beb7-5857-4685-be1f-d57550cc96cc">
-      <Terms xmlns="http://schemas.microsoft.com/office/infopath/2007/PartnerControls"/>
-    </LocalizationTagsTaxHTField0>
-    <UACurrentWords xmlns="4873beb7-5857-4685-be1f-d57550cc96cc" xsi:nil="true"/>
-    <ArtSampleDocs xmlns="4873beb7-5857-4685-be1f-d57550cc96cc" xsi:nil="true"/>
-    <UALocRecommendation xmlns="4873beb7-5857-4685-be1f-d57550cc96cc">Localize</UALocRecommendation>
-    <Manager xmlns="4873beb7-5857-4685-be1f-d57550cc96cc" xsi:nil="true"/>
-    <LocOverallHandbackStatusLookup xmlns="4873beb7-5857-4685-be1f-d57550cc96cc" xsi:nil="true"/>
-    <ShowIn xmlns="4873beb7-5857-4685-be1f-d57550cc96cc">Show everywhere</ShowIn>
-    <UANotes xmlns="4873beb7-5857-4685-be1f-d57550cc96cc" xsi:nil="true"/>
-    <InternalTagsTaxHTField0 xmlns="4873beb7-5857-4685-be1f-d57550cc96cc">
-      <Terms xmlns="http://schemas.microsoft.com/office/infopath/2007/PartnerControls"/>
-    </InternalTagsTaxHTField0>
-    <CSXHash xmlns="4873beb7-5857-4685-be1f-d57550cc96cc" xsi:nil="true"/>
-    <VoteCount xmlns="4873beb7-5857-4685-be1f-d57550cc96cc" xsi:nil="true"/>
-    <AssetExpire xmlns="4873beb7-5857-4685-be1f-d57550cc96cc">2029-05-12T07:00:00+00:00</AssetExpire>
-    <DSATActionTaken xmlns="4873beb7-5857-4685-be1f-d57550cc96cc" xsi:nil="true"/>
-    <CSXSubmissionMarket xmlns="4873beb7-5857-4685-be1f-d57550cc96cc" xsi:nil="true"/>
-    <LocMarketGroupTiers2 xmlns="4873beb7-5857-4685-be1f-d57550cc96cc" xsi:nil="true"/>
-  </documentManagement>
-</p:properties>
-</file>
-
-<file path=customXml/item2.xml><?xml version="1.0" encoding="utf-8"?>
 <ct:contentTypeSchema xmlns:ct="http://schemas.microsoft.com/office/2006/metadata/contentType" xmlns:ma="http://schemas.microsoft.com/office/2006/metadata/properties/metaAttributes" ct:_="" ma:_="" ma:contentTypeName="TemplateFile" ma:contentTypeID="0x0101006EDDDB5EE6D98C44930B742096920B300400F5B6D36B3EF94B4E9A635CDF2A18F5B8" ma:contentTypeVersion="72" ma:contentTypeDescription="Create a new document." ma:contentTypeScope="" ma:versionID="a23e56308344d904b51738559c3d67c9">
   <xsd:schema xmlns:xsd="http://www.w3.org/2001/XMLSchema" xmlns:xs="http://www.w3.org/2001/XMLSchema" xmlns:p="http://schemas.microsoft.com/office/2006/metadata/properties" xmlns:ns2="4873beb7-5857-4685-be1f-d57550cc96cc" targetNamespace="http://schemas.microsoft.com/office/2006/metadata/properties" ma:root="true" ma:fieldsID="cd0908cc4600e77bf5da051303e00c8d" ns2:_="">
     <xsd:import namespace="4873beb7-5857-4685-be1f-d57550cc96cc"/>
@@ -13040,6 +14312,142 @@
 </ct:contentTypeSchema>
 </file>
 
+<file path=customXml/item2.xml><?xml version="1.0" encoding="utf-8"?>
+<p:properties xmlns:p="http://schemas.microsoft.com/office/2006/metadata/properties" xmlns:xsi="http://www.w3.org/2001/XMLSchema-instance" xmlns:pc="http://schemas.microsoft.com/office/infopath/2007/PartnerControls">
+  <documentManagement>
+    <LocPublishedLinkedAssetsLookup xmlns="4873beb7-5857-4685-be1f-d57550cc96cc" xsi:nil="true"/>
+    <ApprovalStatus xmlns="4873beb7-5857-4685-be1f-d57550cc96cc">InProgress</ApprovalStatus>
+    <MarketSpecific xmlns="4873beb7-5857-4685-be1f-d57550cc96cc">false</MarketSpecific>
+    <LocComments xmlns="4873beb7-5857-4685-be1f-d57550cc96cc" xsi:nil="true"/>
+    <LocLastLocAttemptVersionTypeLookup xmlns="4873beb7-5857-4685-be1f-d57550cc96cc" xsi:nil="true"/>
+    <DirectSourceMarket xmlns="4873beb7-5857-4685-be1f-d57550cc96cc" xsi:nil="true"/>
+    <ThumbnailAssetId xmlns="4873beb7-5857-4685-be1f-d57550cc96cc" xsi:nil="true"/>
+    <PrimaryImageGen xmlns="4873beb7-5857-4685-be1f-d57550cc96cc">false</PrimaryImageGen>
+    <LocNewPublishedVersionLookup xmlns="4873beb7-5857-4685-be1f-d57550cc96cc" xsi:nil="true"/>
+    <LegacyData xmlns="4873beb7-5857-4685-be1f-d57550cc96cc" xsi:nil="true"/>
+    <LocRecommendedHandoff xmlns="4873beb7-5857-4685-be1f-d57550cc96cc" xsi:nil="true"/>
+    <BusinessGroup xmlns="4873beb7-5857-4685-be1f-d57550cc96cc" xsi:nil="true"/>
+    <BlockPublish xmlns="4873beb7-5857-4685-be1f-d57550cc96cc">false</BlockPublish>
+    <TPFriendlyName xmlns="4873beb7-5857-4685-be1f-d57550cc96cc" xsi:nil="true"/>
+    <LocOverallPublishStatusLookup xmlns="4873beb7-5857-4685-be1f-d57550cc96cc" xsi:nil="true"/>
+    <NumericId xmlns="4873beb7-5857-4685-be1f-d57550cc96cc" xsi:nil="true"/>
+    <APEditor xmlns="4873beb7-5857-4685-be1f-d57550cc96cc">
+      <UserInfo>
+        <DisplayName/>
+        <AccountId xsi:nil="true"/>
+        <AccountType/>
+      </UserInfo>
+    </APEditor>
+    <SourceTitle xmlns="4873beb7-5857-4685-be1f-d57550cc96cc" xsi:nil="true"/>
+    <OpenTemplate xmlns="4873beb7-5857-4685-be1f-d57550cc96cc">true</OpenTemplate>
+    <LocOverallLocStatusLookup xmlns="4873beb7-5857-4685-be1f-d57550cc96cc" xsi:nil="true"/>
+    <UALocComments xmlns="4873beb7-5857-4685-be1f-d57550cc96cc" xsi:nil="true"/>
+    <ParentAssetId xmlns="4873beb7-5857-4685-be1f-d57550cc96cc" xsi:nil="true"/>
+    <IntlLangReviewDate xmlns="4873beb7-5857-4685-be1f-d57550cc96cc" xsi:nil="true"/>
+    <FeatureTagsTaxHTField0 xmlns="4873beb7-5857-4685-be1f-d57550cc96cc">
+      <Terms xmlns="http://schemas.microsoft.com/office/infopath/2007/PartnerControls"/>
+    </FeatureTagsTaxHTField0>
+    <PublishStatusLookup xmlns="4873beb7-5857-4685-be1f-d57550cc96cc">
+      <Value>1345093</Value>
+    </PublishStatusLookup>
+    <Providers xmlns="4873beb7-5857-4685-be1f-d57550cc96cc" xsi:nil="true"/>
+    <MachineTranslated xmlns="4873beb7-5857-4685-be1f-d57550cc96cc">false</MachineTranslated>
+    <OriginalSourceMarket xmlns="4873beb7-5857-4685-be1f-d57550cc96cc" xsi:nil="true"/>
+    <APDescription xmlns="4873beb7-5857-4685-be1f-d57550cc96cc">This simple template design works for technology and  businesses, but it's versatile enough to use in other contexts.  It features multiple slide layouts designed for widescreen (16x9 resolution) and includes a sample SmartArt list and chart that are easily editable.</APDescription>
+    <ClipArtFilename xmlns="4873beb7-5857-4685-be1f-d57550cc96cc" xsi:nil="true"/>
+    <ContentItem xmlns="4873beb7-5857-4685-be1f-d57550cc96cc" xsi:nil="true"/>
+    <TPInstallLocation xmlns="4873beb7-5857-4685-be1f-d57550cc96cc" xsi:nil="true"/>
+    <PublishTargets xmlns="4873beb7-5857-4685-be1f-d57550cc96cc">OfficeOnlineVNext</PublishTargets>
+    <TimesCloned xmlns="4873beb7-5857-4685-be1f-d57550cc96cc" xsi:nil="true"/>
+    <AssetStart xmlns="4873beb7-5857-4685-be1f-d57550cc96cc">2011-11-26T00:30:00+00:00</AssetStart>
+    <Provider xmlns="4873beb7-5857-4685-be1f-d57550cc96cc" xsi:nil="true"/>
+    <AcquiredFrom xmlns="4873beb7-5857-4685-be1f-d57550cc96cc">Internal MS</AcquiredFrom>
+    <FriendlyTitle xmlns="4873beb7-5857-4685-be1f-d57550cc96cc" xsi:nil="true"/>
+    <LastHandOff xmlns="4873beb7-5857-4685-be1f-d57550cc96cc" xsi:nil="true"/>
+    <TPClientViewer xmlns="4873beb7-5857-4685-be1f-d57550cc96cc" xsi:nil="true"/>
+    <TemplateStatus xmlns="4873beb7-5857-4685-be1f-d57550cc96cc">Complete</TemplateStatus>
+    <Downloads xmlns="4873beb7-5857-4685-be1f-d57550cc96cc">0</Downloads>
+    <OOCacheId xmlns="4873beb7-5857-4685-be1f-d57550cc96cc" xsi:nil="true"/>
+    <IsDeleted xmlns="4873beb7-5857-4685-be1f-d57550cc96cc">false</IsDeleted>
+    <LocPublishedDependentAssetsLookup xmlns="4873beb7-5857-4685-be1f-d57550cc96cc" xsi:nil="true"/>
+    <TPExecutable xmlns="4873beb7-5857-4685-be1f-d57550cc96cc" xsi:nil="true"/>
+    <EditorialTags xmlns="4873beb7-5857-4685-be1f-d57550cc96cc" xsi:nil="true"/>
+    <SubmitterId xmlns="4873beb7-5857-4685-be1f-d57550cc96cc" xsi:nil="true"/>
+    <ApprovalLog xmlns="4873beb7-5857-4685-be1f-d57550cc96cc" xsi:nil="true"/>
+    <AssetType xmlns="4873beb7-5857-4685-be1f-d57550cc96cc">TP</AssetType>
+    <BugNumber xmlns="4873beb7-5857-4685-be1f-d57550cc96cc" xsi:nil="true"/>
+    <CSXSubmissionDate xmlns="4873beb7-5857-4685-be1f-d57550cc96cc" xsi:nil="true"/>
+    <CSXUpdate xmlns="4873beb7-5857-4685-be1f-d57550cc96cc">false</CSXUpdate>
+    <Milestone xmlns="4873beb7-5857-4685-be1f-d57550cc96cc" xsi:nil="true"/>
+    <RecommendationsModifier xmlns="4873beb7-5857-4685-be1f-d57550cc96cc" xsi:nil="true"/>
+    <OriginAsset xmlns="4873beb7-5857-4685-be1f-d57550cc96cc" xsi:nil="true"/>
+    <TPComponent xmlns="4873beb7-5857-4685-be1f-d57550cc96cc" xsi:nil="true"/>
+    <AssetId xmlns="4873beb7-5857-4685-be1f-d57550cc96cc">TP102787989</AssetId>
+    <IntlLocPriority xmlns="4873beb7-5857-4685-be1f-d57550cc96cc" xsi:nil="true"/>
+    <PolicheckWords xmlns="4873beb7-5857-4685-be1f-d57550cc96cc" xsi:nil="true"/>
+    <TPLaunchHelpLink xmlns="4873beb7-5857-4685-be1f-d57550cc96cc" xsi:nil="true"/>
+    <TPApplication xmlns="4873beb7-5857-4685-be1f-d57550cc96cc" xsi:nil="true"/>
+    <CrawlForDependencies xmlns="4873beb7-5857-4685-be1f-d57550cc96cc">false</CrawlForDependencies>
+    <HandoffToMSDN xmlns="4873beb7-5857-4685-be1f-d57550cc96cc" xsi:nil="true"/>
+    <PlannedPubDate xmlns="4873beb7-5857-4685-be1f-d57550cc96cc" xsi:nil="true"/>
+    <IntlLangReviewer xmlns="4873beb7-5857-4685-be1f-d57550cc96cc" xsi:nil="true"/>
+    <TrustLevel xmlns="4873beb7-5857-4685-be1f-d57550cc96cc">1 Microsoft Managed Content</TrustLevel>
+    <LocLastLocAttemptVersionLookup xmlns="4873beb7-5857-4685-be1f-d57550cc96cc">694266</LocLastLocAttemptVersionLookup>
+    <LocProcessedForHandoffsLookup xmlns="4873beb7-5857-4685-be1f-d57550cc96cc" xsi:nil="true"/>
+    <IsSearchable xmlns="4873beb7-5857-4685-be1f-d57550cc96cc">true</IsSearchable>
+    <TemplateTemplateType xmlns="4873beb7-5857-4685-be1f-d57550cc96cc">PowerPoint Presentation Template</TemplateTemplateType>
+    <CampaignTagsTaxHTField0 xmlns="4873beb7-5857-4685-be1f-d57550cc96cc">
+      <Terms xmlns="http://schemas.microsoft.com/office/infopath/2007/PartnerControls"/>
+    </CampaignTagsTaxHTField0>
+    <TPNamespace xmlns="4873beb7-5857-4685-be1f-d57550cc96cc" xsi:nil="true"/>
+    <LocOverallPreviewStatusLookup xmlns="4873beb7-5857-4685-be1f-d57550cc96cc" xsi:nil="true"/>
+    <TaxCatchAll xmlns="4873beb7-5857-4685-be1f-d57550cc96cc"/>
+    <Markets xmlns="4873beb7-5857-4685-be1f-d57550cc96cc"/>
+    <UAProjectedTotalWords xmlns="4873beb7-5857-4685-be1f-d57550cc96cc" xsi:nil="true"/>
+    <IntlLangReview xmlns="4873beb7-5857-4685-be1f-d57550cc96cc" xsi:nil="true"/>
+    <OutputCachingOn xmlns="4873beb7-5857-4685-be1f-d57550cc96cc">false</OutputCachingOn>
+    <AverageRating xmlns="4873beb7-5857-4685-be1f-d57550cc96cc" xsi:nil="true"/>
+    <APAuthor xmlns="4873beb7-5857-4685-be1f-d57550cc96cc">
+      <UserInfo>
+        <DisplayName>REDMOND\kristaa</DisplayName>
+        <AccountId>136</AccountId>
+        <AccountType/>
+      </UserInfo>
+    </APAuthor>
+    <LocManualTestRequired xmlns="4873beb7-5857-4685-be1f-d57550cc96cc">false</LocManualTestRequired>
+    <TPCommandLine xmlns="4873beb7-5857-4685-be1f-d57550cc96cc" xsi:nil="true"/>
+    <TPAppVersion xmlns="4873beb7-5857-4685-be1f-d57550cc96cc" xsi:nil="true"/>
+    <EditorialStatus xmlns="4873beb7-5857-4685-be1f-d57550cc96cc">Complete</EditorialStatus>
+    <LastModifiedDateTime xmlns="4873beb7-5857-4685-be1f-d57550cc96cc" xsi:nil="true"/>
+    <ScenarioTagsTaxHTField0 xmlns="4873beb7-5857-4685-be1f-d57550cc96cc">
+      <Terms xmlns="http://schemas.microsoft.com/office/infopath/2007/PartnerControls"/>
+    </ScenarioTagsTaxHTField0>
+    <LocProcessedForMarketsLookup xmlns="4873beb7-5857-4685-be1f-d57550cc96cc" xsi:nil="true"/>
+    <TPLaunchHelpLinkType xmlns="4873beb7-5857-4685-be1f-d57550cc96cc">Template</TPLaunchHelpLinkType>
+    <OriginalRelease xmlns="4873beb7-5857-4685-be1f-d57550cc96cc">15</OriginalRelease>
+    <LocalizationTagsTaxHTField0 xmlns="4873beb7-5857-4685-be1f-d57550cc96cc">
+      <Terms xmlns="http://schemas.microsoft.com/office/infopath/2007/PartnerControls"/>
+    </LocalizationTagsTaxHTField0>
+    <UACurrentWords xmlns="4873beb7-5857-4685-be1f-d57550cc96cc" xsi:nil="true"/>
+    <ArtSampleDocs xmlns="4873beb7-5857-4685-be1f-d57550cc96cc" xsi:nil="true"/>
+    <UALocRecommendation xmlns="4873beb7-5857-4685-be1f-d57550cc96cc">Localize</UALocRecommendation>
+    <Manager xmlns="4873beb7-5857-4685-be1f-d57550cc96cc" xsi:nil="true"/>
+    <LocOverallHandbackStatusLookup xmlns="4873beb7-5857-4685-be1f-d57550cc96cc" xsi:nil="true"/>
+    <ShowIn xmlns="4873beb7-5857-4685-be1f-d57550cc96cc">Show everywhere</ShowIn>
+    <UANotes xmlns="4873beb7-5857-4685-be1f-d57550cc96cc" xsi:nil="true"/>
+    <InternalTagsTaxHTField0 xmlns="4873beb7-5857-4685-be1f-d57550cc96cc">
+      <Terms xmlns="http://schemas.microsoft.com/office/infopath/2007/PartnerControls"/>
+    </InternalTagsTaxHTField0>
+    <CSXHash xmlns="4873beb7-5857-4685-be1f-d57550cc96cc" xsi:nil="true"/>
+    <VoteCount xmlns="4873beb7-5857-4685-be1f-d57550cc96cc" xsi:nil="true"/>
+    <AssetExpire xmlns="4873beb7-5857-4685-be1f-d57550cc96cc">2029-05-12T07:00:00+00:00</AssetExpire>
+    <DSATActionTaken xmlns="4873beb7-5857-4685-be1f-d57550cc96cc" xsi:nil="true"/>
+    <CSXSubmissionMarket xmlns="4873beb7-5857-4685-be1f-d57550cc96cc" xsi:nil="true"/>
+    <LocMarketGroupTiers2 xmlns="4873beb7-5857-4685-be1f-d57550cc96cc" xsi:nil="true"/>
+  </documentManagement>
+</p:properties>
+</file>
+
 <file path=customXml/item3.xml><?xml version="1.0" encoding="utf-8"?>
 <?mso-contentType ?>
 <FormTemplates xmlns="http://schemas.microsoft.com/sharepoint/v3/contenttype/forms">
@@ -13050,22 +14458,6 @@
 </file>
 
 <file path=customXml/itemProps1.xml><?xml version="1.0" encoding="utf-8"?>
-<ds:datastoreItem xmlns:ds="http://schemas.openxmlformats.org/officeDocument/2006/customXml" ds:itemID="{60C67BEE-D13F-4BD2-98A5-34D8A0977F68}">
-  <ds:schemaRefs>
-    <ds:schemaRef ds:uri="4873beb7-5857-4685-be1f-d57550cc96cc"/>
-    <ds:schemaRef ds:uri="http://schemas.openxmlformats.org/package/2006/metadata/core-properties"/>
-    <ds:schemaRef ds:uri="http://purl.org/dc/terms/"/>
-    <ds:schemaRef ds:uri="http://schemas.microsoft.com/office/2006/documentManagement/types"/>
-    <ds:schemaRef ds:uri="http://purl.org/dc/elements/1.1/"/>
-    <ds:schemaRef ds:uri="http://schemas.microsoft.com/office/2006/metadata/properties"/>
-    <ds:schemaRef ds:uri="http://schemas.microsoft.com/office/infopath/2007/PartnerControls"/>
-    <ds:schemaRef ds:uri="http://www.w3.org/XML/1998/namespace"/>
-    <ds:schemaRef ds:uri="http://purl.org/dc/dcmitype/"/>
-  </ds:schemaRefs>
-</ds:datastoreItem>
-</file>
-
-<file path=customXml/itemProps2.xml><?xml version="1.0" encoding="utf-8"?>
 <ds:datastoreItem xmlns:ds="http://schemas.openxmlformats.org/officeDocument/2006/customXml" ds:itemID="{A09BF4D4-EF60-4196-BFC3-9462D607978C}">
   <ds:schemaRefs>
     <ds:schemaRef ds:uri="http://schemas.microsoft.com/office/2006/metadata/contentType"/>
@@ -13083,6 +14475,22 @@
 </ds:datastoreItem>
 </file>
 
+<file path=customXml/itemProps2.xml><?xml version="1.0" encoding="utf-8"?>
+<ds:datastoreItem xmlns:ds="http://schemas.openxmlformats.org/officeDocument/2006/customXml" ds:itemID="{60C67BEE-D13F-4BD2-98A5-34D8A0977F68}">
+  <ds:schemaRefs>
+    <ds:schemaRef ds:uri="4873beb7-5857-4685-be1f-d57550cc96cc"/>
+    <ds:schemaRef ds:uri="http://schemas.openxmlformats.org/package/2006/metadata/core-properties"/>
+    <ds:schemaRef ds:uri="http://purl.org/dc/terms/"/>
+    <ds:schemaRef ds:uri="http://schemas.microsoft.com/office/2006/documentManagement/types"/>
+    <ds:schemaRef ds:uri="http://purl.org/dc/elements/1.1/"/>
+    <ds:schemaRef ds:uri="http://schemas.microsoft.com/office/2006/metadata/properties"/>
+    <ds:schemaRef ds:uri="http://schemas.microsoft.com/office/infopath/2007/PartnerControls"/>
+    <ds:schemaRef ds:uri="http://www.w3.org/XML/1998/namespace"/>
+    <ds:schemaRef ds:uri="http://purl.org/dc/dcmitype/"/>
+  </ds:schemaRefs>
+</ds:datastoreItem>
+</file>
+
 <file path=customXml/itemProps3.xml><?xml version="1.0" encoding="utf-8"?>
 <ds:datastoreItem xmlns:ds="http://schemas.openxmlformats.org/officeDocument/2006/customXml" ds:itemID="{3836F65B-1B07-41EE-A0E8-BC6EF3855225}">
   <ds:schemaRefs>

</xml_diff>